<commit_message>
add links to PPT for Custom Core
</commit_message>
<xml_diff>
--- a/Custom Core from HDL with APB Interface.pptx
+++ b/Custom Core from HDL with APB Interface.pptx
@@ -21494,7 +21494,17 @@
             </a:pPr>
             <a:r>
               <a:rPr lang="en-US" sz="2200" dirty="0"/>
-              <a:t>You can download the source files here. </a:t>
+              <a:t>You can download the source files </a:t>
+            </a:r>
+            <a:r>
+              <a:rPr lang="en-US" sz="2200" dirty="0">
+                <a:hlinkClick r:id="rId2"/>
+              </a:rPr>
+              <a:t>here</a:t>
+            </a:r>
+            <a:r>
+              <a:rPr lang="en-US" sz="2200" dirty="0"/>
+              <a:t>. </a:t>
             </a:r>
           </a:p>
           <a:p>
@@ -21548,7 +21558,7 @@
           <p:nvPr/>
         </p:nvPicPr>
         <p:blipFill>
-          <a:blip r:embed="rId2"/>
+          <a:blip r:embed="rId3"/>
           <a:stretch>
             <a:fillRect/>
           </a:stretch>
@@ -22412,8 +22422,14 @@
               </a:spcAft>
             </a:pPr>
             <a:r>
+              <a:rPr lang="en-US" sz="2200" dirty="0">
+                <a:hlinkClick r:id="rId2"/>
+              </a:rPr>
+              <a:t>Here</a:t>
+            </a:r>
+            <a:r>
               <a:rPr lang="en-US" sz="2200" dirty="0"/>
-              <a:t>Here is the source code for the modified </a:t>
+              <a:t> is the source code for the modified </a:t>
             </a:r>
             <a:r>
               <a:rPr lang="en-US" sz="2200" dirty="0" err="1"/>
@@ -22457,7 +22473,7 @@
           <p:nvPr/>
         </p:nvPicPr>
         <p:blipFill>
-          <a:blip r:embed="rId2"/>
+          <a:blip r:embed="rId3"/>
           <a:stretch>
             <a:fillRect/>
           </a:stretch>
@@ -22527,7 +22543,7 @@
               <p:nvPr/>
             </p:nvPicPr>
             <p:blipFill>
-              <a:blip r:embed="rId3"/>
+              <a:blip r:embed="rId4"/>
               <a:stretch>
                 <a:fillRect/>
               </a:stretch>
@@ -22744,7 +22760,7 @@
               <p:nvPr/>
             </p:nvPicPr>
             <p:blipFill rotWithShape="1">
-              <a:blip r:embed="rId4"/>
+              <a:blip r:embed="rId5"/>
               <a:srcRect t="1416"/>
               <a:stretch/>
             </p:blipFill>
@@ -27983,7 +27999,17 @@
             </a:pPr>
             <a:r>
               <a:rPr lang="en-US" dirty="0"/>
-              <a:t>Enter the Verilog code to add two 8-bit numbers</a:t>
+              <a:t>Enter the </a:t>
+            </a:r>
+            <a:r>
+              <a:rPr lang="en-US" dirty="0">
+                <a:hlinkClick r:id="rId2"/>
+              </a:rPr>
+              <a:t>Verilog code</a:t>
+            </a:r>
+            <a:r>
+              <a:rPr lang="en-US" dirty="0"/>
+              <a:t> to add two 8-bit numbers</a:t>
             </a:r>
           </a:p>
           <a:p>
@@ -28323,7 +28349,7 @@
             <p:nvPr/>
           </p:nvPicPr>
           <p:blipFill>
-            <a:blip r:embed="rId2"/>
+            <a:blip r:embed="rId3"/>
             <a:stretch>
               <a:fillRect/>
             </a:stretch>
@@ -28410,7 +28436,7 @@
             <p:nvPr/>
           </p:nvPicPr>
           <p:blipFill>
-            <a:blip r:embed="rId3"/>
+            <a:blip r:embed="rId4"/>
             <a:stretch>
               <a:fillRect/>
             </a:stretch>

</xml_diff>

<commit_message>
sccb apb core & custom core PPT
</commit_message>
<xml_diff>
--- a/Custom Core from HDL with APB Interface.pptx
+++ b/Custom Core from HDL with APB Interface.pptx
@@ -225,7 +225,7 @@
           <a:p>
             <a:fld id="{FB9A324F-0E12-4249-B222-9A2A35FEBB3B}" type="datetimeFigureOut">
               <a:rPr lang="en-US" smtClean="0"/>
-              <a:t>1/22/2021</a:t>
+              <a:t>1/27/2021</a:t>
             </a:fld>
             <a:endParaRPr lang="en-US"/>
           </a:p>
@@ -9285,7 +9285,7 @@
           <a:p>
             <a:fld id="{02EE89BC-6575-45C3-BF9B-DA9153772B8E}" type="datetimeFigureOut">
               <a:rPr lang="en-US" smtClean="0"/>
-              <a:t>1/22/2021</a:t>
+              <a:t>1/27/2021</a:t>
             </a:fld>
             <a:endParaRPr lang="en-US"/>
           </a:p>
@@ -9492,7 +9492,7 @@
           <a:p>
             <a:fld id="{02EE89BC-6575-45C3-BF9B-DA9153772B8E}" type="datetimeFigureOut">
               <a:rPr lang="en-US" smtClean="0"/>
-              <a:t>1/22/2021</a:t>
+              <a:t>1/27/2021</a:t>
             </a:fld>
             <a:endParaRPr lang="en-US"/>
           </a:p>
@@ -9672,7 +9672,7 @@
           <a:p>
             <a:fld id="{02EE89BC-6575-45C3-BF9B-DA9153772B8E}" type="datetimeFigureOut">
               <a:rPr lang="en-US" smtClean="0"/>
-              <a:t>1/22/2021</a:t>
+              <a:t>1/27/2021</a:t>
             </a:fld>
             <a:endParaRPr lang="en-US"/>
           </a:p>
@@ -9877,7 +9877,7 @@
           <a:p>
             <a:fld id="{02EE89BC-6575-45C3-BF9B-DA9153772B8E}" type="datetimeFigureOut">
               <a:rPr lang="en-US" smtClean="0"/>
-              <a:t>1/22/2021</a:t>
+              <a:t>1/27/2021</a:t>
             </a:fld>
             <a:endParaRPr lang="en-US"/>
           </a:p>
@@ -18775,7 +18775,7 @@
           <a:p>
             <a:fld id="{02EE89BC-6575-45C3-BF9B-DA9153772B8E}" type="datetimeFigureOut">
               <a:rPr lang="en-US" smtClean="0"/>
-              <a:t>1/22/2021</a:t>
+              <a:t>1/27/2021</a:t>
             </a:fld>
             <a:endParaRPr lang="en-US"/>
           </a:p>
@@ -19049,7 +19049,7 @@
           <a:p>
             <a:fld id="{02EE89BC-6575-45C3-BF9B-DA9153772B8E}" type="datetimeFigureOut">
               <a:rPr lang="en-US" smtClean="0"/>
-              <a:t>1/22/2021</a:t>
+              <a:t>1/27/2021</a:t>
             </a:fld>
             <a:endParaRPr lang="en-US"/>
           </a:p>
@@ -19447,7 +19447,7 @@
           <a:p>
             <a:fld id="{02EE89BC-6575-45C3-BF9B-DA9153772B8E}" type="datetimeFigureOut">
               <a:rPr lang="en-US" smtClean="0"/>
-              <a:t>1/22/2021</a:t>
+              <a:t>1/27/2021</a:t>
             </a:fld>
             <a:endParaRPr lang="en-US"/>
           </a:p>
@@ -19565,7 +19565,7 @@
           <a:p>
             <a:fld id="{02EE89BC-6575-45C3-BF9B-DA9153772B8E}" type="datetimeFigureOut">
               <a:rPr lang="en-US" smtClean="0"/>
-              <a:t>1/22/2021</a:t>
+              <a:t>1/27/2021</a:t>
             </a:fld>
             <a:endParaRPr lang="en-US"/>
           </a:p>
@@ -19660,7 +19660,7 @@
           <a:p>
             <a:fld id="{02EE89BC-6575-45C3-BF9B-DA9153772B8E}" type="datetimeFigureOut">
               <a:rPr lang="en-US" smtClean="0"/>
-              <a:t>1/22/2021</a:t>
+              <a:t>1/27/2021</a:t>
             </a:fld>
             <a:endParaRPr lang="en-US"/>
           </a:p>
@@ -19950,7 +19950,7 @@
           <a:p>
             <a:fld id="{02EE89BC-6575-45C3-BF9B-DA9153772B8E}" type="datetimeFigureOut">
               <a:rPr lang="en-US" smtClean="0"/>
-              <a:t>1/22/2021</a:t>
+              <a:t>1/27/2021</a:t>
             </a:fld>
             <a:endParaRPr lang="en-US"/>
           </a:p>
@@ -20230,7 +20230,7 @@
           <a:p>
             <a:fld id="{02EE89BC-6575-45C3-BF9B-DA9153772B8E}" type="datetimeFigureOut">
               <a:rPr lang="en-US" smtClean="0"/>
-              <a:t>1/22/2021</a:t>
+              <a:t>1/27/2021</a:t>
             </a:fld>
             <a:endParaRPr lang="en-US"/>
           </a:p>
@@ -20483,7 +20483,7 @@
           <a:p>
             <a:fld id="{02EE89BC-6575-45C3-BF9B-DA9153772B8E}" type="datetimeFigureOut">
               <a:rPr lang="en-US" smtClean="0"/>
-              <a:t>1/22/2021</a:t>
+              <a:t>1/27/2021</a:t>
             </a:fld>
             <a:endParaRPr lang="en-US"/>
           </a:p>
@@ -21477,7 +21477,7 @@
             </a:pPr>
             <a:r>
               <a:rPr lang="en-US" dirty="0"/>
-              <a:t>Add the code in Appendix A, B, C.</a:t>
+              <a:t>Add the code in Appendix A, B, C to the respective files.</a:t>
             </a:r>
           </a:p>
           <a:p>
@@ -21537,7 +21537,7 @@
             </a:r>
             <a:r>
               <a:rPr lang="en-US" sz="2200" dirty="0"/>
-              <a:t>to the one found in Step 7</a:t>
+              <a:t>to the one found in Step 7 #5</a:t>
             </a:r>
             <a:endParaRPr lang="en-US" sz="2200" b="1" dirty="0"/>
           </a:p>
@@ -22350,12 +22350,16 @@
               <a:t>main.c</a:t>
             </a:r>
             <a:r>
+              <a:rPr lang="en-US" dirty="0"/>
+              <a:t>,</a:t>
+            </a:r>
+            <a:r>
               <a:rPr lang="en-US" b="1" dirty="0"/>
               <a:t> </a:t>
             </a:r>
             <a:r>
               <a:rPr lang="en-US" dirty="0"/>
-              <a:t>add the code in the red box</a:t>
+              <a:t>add the code in the red boxes</a:t>
             </a:r>
           </a:p>
           <a:p>
@@ -22389,7 +22393,7 @@
             </a:pPr>
             <a:r>
               <a:rPr lang="en-US" sz="2200" dirty="0"/>
-              <a:t>You can change the intro message. In this case, it is changed to “Checking…”</a:t>
+              <a:t>You can change the intro message. In this case, it is modified to “Checking…”</a:t>
             </a:r>
           </a:p>
           <a:p>
@@ -22707,10 +22711,10 @@
       </p:grpSp>
       <p:grpSp>
         <p:nvGrpSpPr>
-          <p:cNvPr id="8" name="Group 7">
+          <p:cNvPr id="21" name="Group 20">
             <a:extLst>
               <a:ext uri="{FF2B5EF4-FFF2-40B4-BE49-F238E27FC236}">
-                <a16:creationId xmlns:a16="http://schemas.microsoft.com/office/drawing/2014/main" id="{515B9078-BCC9-4A6B-BC0B-2432C01AAAE5}"/>
+                <a16:creationId xmlns:a16="http://schemas.microsoft.com/office/drawing/2014/main" id="{2C27411F-D2B1-43F1-A3BA-B406A63AF525}"/>
               </a:ext>
             </a:extLst>
           </p:cNvPr>
@@ -22719,18 +22723,48 @@
         </p:nvGrpSpPr>
         <p:grpSpPr>
           <a:xfrm>
-            <a:off x="7299614" y="633105"/>
-            <a:ext cx="3614738" cy="5908341"/>
-            <a:chOff x="7299614" y="633105"/>
-            <a:chExt cx="3614738" cy="5908341"/>
+            <a:off x="7349200" y="919520"/>
+            <a:ext cx="4007511" cy="5613380"/>
+            <a:chOff x="7349200" y="919520"/>
+            <a:chExt cx="4007511" cy="5613380"/>
           </a:xfrm>
         </p:grpSpPr>
+        <p:pic>
+          <p:nvPicPr>
+            <p:cNvPr id="20" name="Picture 19">
+              <a:extLst>
+                <a:ext uri="{FF2B5EF4-FFF2-40B4-BE49-F238E27FC236}">
+                  <a16:creationId xmlns:a16="http://schemas.microsoft.com/office/drawing/2014/main" id="{1E75C03B-2CDA-42B9-90D3-CDCF1AB09A84}"/>
+                </a:ext>
+              </a:extLst>
+            </p:cNvPr>
+            <p:cNvPicPr>
+              <a:picLocks noChangeAspect="1"/>
+            </p:cNvPicPr>
+            <p:nvPr/>
+          </p:nvPicPr>
+          <p:blipFill>
+            <a:blip r:embed="rId5"/>
+            <a:stretch>
+              <a:fillRect/>
+            </a:stretch>
+          </p:blipFill>
+          <p:spPr>
+            <a:xfrm>
+              <a:off x="7391930" y="919520"/>
+              <a:ext cx="3964781" cy="5336381"/>
+            </a:xfrm>
+            <a:prstGeom prst="rect">
+              <a:avLst/>
+            </a:prstGeom>
+          </p:spPr>
+        </p:pic>
         <p:grpSp>
           <p:nvGrpSpPr>
-            <p:cNvPr id="6" name="Group 5">
+            <p:cNvPr id="8" name="Group 7">
               <a:extLst>
                 <a:ext uri="{FF2B5EF4-FFF2-40B4-BE49-F238E27FC236}">
-                  <a16:creationId xmlns:a16="http://schemas.microsoft.com/office/drawing/2014/main" id="{42DEF5CF-0DE0-4CED-A256-65AD1CA174AD}"/>
+                  <a16:creationId xmlns:a16="http://schemas.microsoft.com/office/drawing/2014/main" id="{515B9078-BCC9-4A6B-BC0B-2432C01AAAE5}"/>
                 </a:ext>
               </a:extLst>
             </p:cNvPr>
@@ -22739,41 +22773,12 @@
           </p:nvGrpSpPr>
           <p:grpSpPr>
             <a:xfrm>
-              <a:off x="7299614" y="633105"/>
-              <a:ext cx="3614738" cy="5908341"/>
-              <a:chOff x="7299614" y="633105"/>
-              <a:chExt cx="3614738" cy="5908341"/>
+              <a:off x="7349200" y="1009650"/>
+              <a:ext cx="3832489" cy="5523250"/>
+              <a:chOff x="7349200" y="1009650"/>
+              <a:chExt cx="3832489" cy="5523250"/>
             </a:xfrm>
           </p:grpSpPr>
-          <p:pic>
-            <p:nvPicPr>
-              <p:cNvPr id="15" name="Picture 14">
-                <a:extLst>
-                  <a:ext uri="{FF2B5EF4-FFF2-40B4-BE49-F238E27FC236}">
-                    <a16:creationId xmlns:a16="http://schemas.microsoft.com/office/drawing/2014/main" id="{FB95A257-7315-45F3-95FB-B2D087B42EA1}"/>
-                  </a:ext>
-                </a:extLst>
-              </p:cNvPr>
-              <p:cNvPicPr>
-                <a:picLocks noChangeAspect="1"/>
-              </p:cNvPicPr>
-              <p:nvPr/>
-            </p:nvPicPr>
-            <p:blipFill rotWithShape="1">
-              <a:blip r:embed="rId5"/>
-              <a:srcRect t="1416"/>
-              <a:stretch/>
-            </p:blipFill>
-            <p:spPr>
-              <a:xfrm>
-                <a:off x="7299614" y="633105"/>
-                <a:ext cx="3614738" cy="5591789"/>
-              </a:xfrm>
-              <a:prstGeom prst="rect">
-                <a:avLst/>
-              </a:prstGeom>
-            </p:spPr>
-          </p:pic>
           <p:sp>
             <p:nvSpPr>
               <p:cNvPr id="12" name="TextBox 11">
@@ -22788,7 +22793,7 @@
             </p:nvSpPr>
             <p:spPr>
               <a:xfrm>
-                <a:off x="7299614" y="6264447"/>
+                <a:off x="7566951" y="6255901"/>
                 <a:ext cx="3614738" cy="276999"/>
               </a:xfrm>
               <a:prstGeom prst="rect">
@@ -22818,163 +22823,163 @@
               </a:p>
             </p:txBody>
           </p:sp>
+          <p:sp>
+            <p:nvSpPr>
+              <p:cNvPr id="16" name="Rectangle 15">
+                <a:extLst>
+                  <a:ext uri="{FF2B5EF4-FFF2-40B4-BE49-F238E27FC236}">
+                    <a16:creationId xmlns:a16="http://schemas.microsoft.com/office/drawing/2014/main" id="{813965A2-2382-4106-8CDE-8C695D8885E2}"/>
+                  </a:ext>
+                </a:extLst>
+              </p:cNvPr>
+              <p:cNvSpPr/>
+              <p:nvPr/>
+            </p:nvSpPr>
+            <p:spPr>
+              <a:xfrm>
+                <a:off x="7349202" y="1009650"/>
+                <a:ext cx="2531397" cy="419100"/>
+              </a:xfrm>
+              <a:prstGeom prst="rect">
+                <a:avLst/>
+              </a:prstGeom>
+              <a:noFill/>
+              <a:ln w="28575">
+                <a:solidFill>
+                  <a:srgbClr val="FF0000"/>
+                </a:solidFill>
+              </a:ln>
+            </p:spPr>
+            <p:style>
+              <a:lnRef idx="2">
+                <a:schemeClr val="accent1">
+                  <a:shade val="50000"/>
+                </a:schemeClr>
+              </a:lnRef>
+              <a:fillRef idx="1">
+                <a:schemeClr val="accent1"/>
+              </a:fillRef>
+              <a:effectRef idx="0">
+                <a:schemeClr val="accent1"/>
+              </a:effectRef>
+              <a:fontRef idx="minor">
+                <a:schemeClr val="lt1"/>
+              </a:fontRef>
+            </p:style>
+            <p:txBody>
+              <a:bodyPr rtlCol="0" anchor="ctr"/>
+              <a:lstStyle/>
+              <a:p>
+                <a:pPr algn="ctr"/>
+                <a:endParaRPr lang="en-US"/>
+              </a:p>
+            </p:txBody>
+          </p:sp>
+          <p:sp>
+            <p:nvSpPr>
+              <p:cNvPr id="17" name="Rectangle 16">
+                <a:extLst>
+                  <a:ext uri="{FF2B5EF4-FFF2-40B4-BE49-F238E27FC236}">
+                    <a16:creationId xmlns:a16="http://schemas.microsoft.com/office/drawing/2014/main" id="{6A885978-C653-43F1-BD3A-222E93379901}"/>
+                  </a:ext>
+                </a:extLst>
+              </p:cNvPr>
+              <p:cNvSpPr/>
+              <p:nvPr/>
+            </p:nvSpPr>
+            <p:spPr>
+              <a:xfrm>
+                <a:off x="7349202" y="2209800"/>
+                <a:ext cx="2531398" cy="148839"/>
+              </a:xfrm>
+              <a:prstGeom prst="rect">
+                <a:avLst/>
+              </a:prstGeom>
+              <a:noFill/>
+              <a:ln w="28575">
+                <a:solidFill>
+                  <a:srgbClr val="FF0000"/>
+                </a:solidFill>
+              </a:ln>
+            </p:spPr>
+            <p:style>
+              <a:lnRef idx="2">
+                <a:schemeClr val="accent1">
+                  <a:shade val="50000"/>
+                </a:schemeClr>
+              </a:lnRef>
+              <a:fillRef idx="1">
+                <a:schemeClr val="accent1"/>
+              </a:fillRef>
+              <a:effectRef idx="0">
+                <a:schemeClr val="accent1"/>
+              </a:effectRef>
+              <a:fontRef idx="minor">
+                <a:schemeClr val="lt1"/>
+              </a:fontRef>
+            </p:style>
+            <p:txBody>
+              <a:bodyPr rtlCol="0" anchor="ctr"/>
+              <a:lstStyle/>
+              <a:p>
+                <a:pPr algn="ctr"/>
+                <a:endParaRPr lang="en-US"/>
+              </a:p>
+            </p:txBody>
+          </p:sp>
+          <p:sp>
+            <p:nvSpPr>
+              <p:cNvPr id="18" name="Rectangle 17">
+                <a:extLst>
+                  <a:ext uri="{FF2B5EF4-FFF2-40B4-BE49-F238E27FC236}">
+                    <a16:creationId xmlns:a16="http://schemas.microsoft.com/office/drawing/2014/main" id="{AFF14700-D5D0-4FB9-AF01-9F5DB1639AC8}"/>
+                  </a:ext>
+                </a:extLst>
+              </p:cNvPr>
+              <p:cNvSpPr/>
+              <p:nvPr/>
+            </p:nvSpPr>
+            <p:spPr>
+              <a:xfrm>
+                <a:off x="7349200" y="3590844"/>
+                <a:ext cx="2728249" cy="1895555"/>
+              </a:xfrm>
+              <a:prstGeom prst="rect">
+                <a:avLst/>
+              </a:prstGeom>
+              <a:noFill/>
+              <a:ln w="28575">
+                <a:solidFill>
+                  <a:srgbClr val="FF0000"/>
+                </a:solidFill>
+              </a:ln>
+            </p:spPr>
+            <p:style>
+              <a:lnRef idx="2">
+                <a:schemeClr val="accent1">
+                  <a:shade val="50000"/>
+                </a:schemeClr>
+              </a:lnRef>
+              <a:fillRef idx="1">
+                <a:schemeClr val="accent1"/>
+              </a:fillRef>
+              <a:effectRef idx="0">
+                <a:schemeClr val="accent1"/>
+              </a:effectRef>
+              <a:fontRef idx="minor">
+                <a:schemeClr val="lt1"/>
+              </a:fontRef>
+            </p:style>
+            <p:txBody>
+              <a:bodyPr rtlCol="0" anchor="ctr"/>
+              <a:lstStyle/>
+              <a:p>
+                <a:pPr algn="ctr"/>
+                <a:endParaRPr lang="en-US"/>
+              </a:p>
+            </p:txBody>
+          </p:sp>
         </p:grpSp>
-        <p:sp>
-          <p:nvSpPr>
-            <p:cNvPr id="16" name="Rectangle 15">
-              <a:extLst>
-                <a:ext uri="{FF2B5EF4-FFF2-40B4-BE49-F238E27FC236}">
-                  <a16:creationId xmlns:a16="http://schemas.microsoft.com/office/drawing/2014/main" id="{813965A2-2382-4106-8CDE-8C695D8885E2}"/>
-                </a:ext>
-              </a:extLst>
-            </p:cNvPr>
-            <p:cNvSpPr/>
-            <p:nvPr/>
-          </p:nvSpPr>
-          <p:spPr>
-            <a:xfrm>
-              <a:off x="7349202" y="1009650"/>
-              <a:ext cx="2531397" cy="419100"/>
-            </a:xfrm>
-            <a:prstGeom prst="rect">
-              <a:avLst/>
-            </a:prstGeom>
-            <a:noFill/>
-            <a:ln w="28575">
-              <a:solidFill>
-                <a:srgbClr val="FF0000"/>
-              </a:solidFill>
-            </a:ln>
-          </p:spPr>
-          <p:style>
-            <a:lnRef idx="2">
-              <a:schemeClr val="accent1">
-                <a:shade val="50000"/>
-              </a:schemeClr>
-            </a:lnRef>
-            <a:fillRef idx="1">
-              <a:schemeClr val="accent1"/>
-            </a:fillRef>
-            <a:effectRef idx="0">
-              <a:schemeClr val="accent1"/>
-            </a:effectRef>
-            <a:fontRef idx="minor">
-              <a:schemeClr val="lt1"/>
-            </a:fontRef>
-          </p:style>
-          <p:txBody>
-            <a:bodyPr rtlCol="0" anchor="ctr"/>
-            <a:lstStyle/>
-            <a:p>
-              <a:pPr algn="ctr"/>
-              <a:endParaRPr lang="en-US"/>
-            </a:p>
-          </p:txBody>
-        </p:sp>
-        <p:sp>
-          <p:nvSpPr>
-            <p:cNvPr id="17" name="Rectangle 16">
-              <a:extLst>
-                <a:ext uri="{FF2B5EF4-FFF2-40B4-BE49-F238E27FC236}">
-                  <a16:creationId xmlns:a16="http://schemas.microsoft.com/office/drawing/2014/main" id="{6A885978-C653-43F1-BD3A-222E93379901}"/>
-                </a:ext>
-              </a:extLst>
-            </p:cNvPr>
-            <p:cNvSpPr/>
-            <p:nvPr/>
-          </p:nvSpPr>
-          <p:spPr>
-            <a:xfrm>
-              <a:off x="7349201" y="2209800"/>
-              <a:ext cx="2890173" cy="152400"/>
-            </a:xfrm>
-            <a:prstGeom prst="rect">
-              <a:avLst/>
-            </a:prstGeom>
-            <a:noFill/>
-            <a:ln w="28575">
-              <a:solidFill>
-                <a:srgbClr val="FF0000"/>
-              </a:solidFill>
-            </a:ln>
-          </p:spPr>
-          <p:style>
-            <a:lnRef idx="2">
-              <a:schemeClr val="accent1">
-                <a:shade val="50000"/>
-              </a:schemeClr>
-            </a:lnRef>
-            <a:fillRef idx="1">
-              <a:schemeClr val="accent1"/>
-            </a:fillRef>
-            <a:effectRef idx="0">
-              <a:schemeClr val="accent1"/>
-            </a:effectRef>
-            <a:fontRef idx="minor">
-              <a:schemeClr val="lt1"/>
-            </a:fontRef>
-          </p:style>
-          <p:txBody>
-            <a:bodyPr rtlCol="0" anchor="ctr"/>
-            <a:lstStyle/>
-            <a:p>
-              <a:pPr algn="ctr"/>
-              <a:endParaRPr lang="en-US"/>
-            </a:p>
-          </p:txBody>
-        </p:sp>
-        <p:sp>
-          <p:nvSpPr>
-            <p:cNvPr id="18" name="Rectangle 17">
-              <a:extLst>
-                <a:ext uri="{FF2B5EF4-FFF2-40B4-BE49-F238E27FC236}">
-                  <a16:creationId xmlns:a16="http://schemas.microsoft.com/office/drawing/2014/main" id="{AFF14700-D5D0-4FB9-AF01-9F5DB1639AC8}"/>
-                </a:ext>
-              </a:extLst>
-            </p:cNvPr>
-            <p:cNvSpPr/>
-            <p:nvPr/>
-          </p:nvSpPr>
-          <p:spPr>
-            <a:xfrm>
-              <a:off x="7349200" y="3590844"/>
-              <a:ext cx="2728249" cy="1895555"/>
-            </a:xfrm>
-            <a:prstGeom prst="rect">
-              <a:avLst/>
-            </a:prstGeom>
-            <a:noFill/>
-            <a:ln w="28575">
-              <a:solidFill>
-                <a:srgbClr val="FF0000"/>
-              </a:solidFill>
-            </a:ln>
-          </p:spPr>
-          <p:style>
-            <a:lnRef idx="2">
-              <a:schemeClr val="accent1">
-                <a:shade val="50000"/>
-              </a:schemeClr>
-            </a:lnRef>
-            <a:fillRef idx="1">
-              <a:schemeClr val="accent1"/>
-            </a:fillRef>
-            <a:effectRef idx="0">
-              <a:schemeClr val="accent1"/>
-            </a:effectRef>
-            <a:fontRef idx="minor">
-              <a:schemeClr val="lt1"/>
-            </a:fontRef>
-          </p:style>
-          <p:txBody>
-            <a:bodyPr rtlCol="0" anchor="ctr"/>
-            <a:lstStyle/>
-            <a:p>
-              <a:pPr algn="ctr"/>
-              <a:endParaRPr lang="en-US"/>
-            </a:p>
-          </p:txBody>
-        </p:sp>
       </p:grpSp>
     </p:spTree>
     <p:extLst>
@@ -23237,7 +23242,7 @@
             </a:r>
             <a:r>
               <a:rPr lang="en-US" dirty="0"/>
-              <a:t> tab add to </a:t>
+              <a:t> tab, add to </a:t>
             </a:r>
             <a:r>
               <a:rPr lang="en-US" b="1" dirty="0"/>
@@ -23702,7 +23707,7 @@
               <a:buNone/>
             </a:pPr>
             <a:r>
-              <a:rPr lang="en-US" sz="1400" b="1" dirty="0">
+              <a:rPr lang="en-US" sz="1200" b="1" dirty="0">
                 <a:solidFill>
                   <a:srgbClr val="7F0055"/>
                 </a:solidFill>
@@ -23711,7 +23716,7 @@
               <a:t>#ifndef</a:t>
             </a:r>
             <a:r>
-              <a:rPr lang="en-US" sz="1400" b="1" dirty="0">
+              <a:rPr lang="en-US" sz="1200" b="1" dirty="0">
                 <a:solidFill>
                   <a:srgbClr val="000000"/>
                 </a:solidFill>
@@ -23734,7 +23739,7 @@
               <a:buNone/>
             </a:pPr>
             <a:r>
-              <a:rPr lang="en-US" sz="1400" b="1" dirty="0">
+              <a:rPr lang="en-US" sz="1200" b="1" dirty="0">
                 <a:solidFill>
                   <a:srgbClr val="7F0055"/>
                 </a:solidFill>
@@ -23743,7 +23748,7 @@
               <a:t>#define</a:t>
             </a:r>
             <a:r>
-              <a:rPr lang="en-US" sz="1400" b="1" dirty="0">
+              <a:rPr lang="en-US" sz="1200" b="1" dirty="0">
                 <a:solidFill>
                   <a:srgbClr val="000000"/>
                 </a:solidFill>
@@ -23765,7 +23770,7 @@
               </a:spcAft>
               <a:buNone/>
             </a:pPr>
-            <a:endParaRPr lang="en-US" sz="1400" dirty="0">
+            <a:endParaRPr lang="en-US" sz="1200" dirty="0">
               <a:latin typeface="Consolas" panose="020B0609020204030204" pitchFamily="49" charset="0"/>
             </a:endParaRPr>
           </a:p>
@@ -23783,7 +23788,7 @@
               <a:buNone/>
             </a:pPr>
             <a:r>
-              <a:rPr lang="en-US" sz="1400" b="1" dirty="0">
+              <a:rPr lang="en-US" sz="1200" b="1" dirty="0">
                 <a:solidFill>
                   <a:srgbClr val="7F0055"/>
                 </a:solidFill>
@@ -23792,7 +23797,7 @@
               <a:t>#include</a:t>
             </a:r>
             <a:r>
-              <a:rPr lang="en-US" sz="1400" b="1" dirty="0">
+              <a:rPr lang="en-US" sz="1200" b="1" dirty="0">
                 <a:solidFill>
                   <a:srgbClr val="000000"/>
                 </a:solidFill>
@@ -23801,7 +23806,7 @@
               <a:t> </a:t>
             </a:r>
             <a:r>
-              <a:rPr lang="en-US" sz="1400" b="1" dirty="0">
+              <a:rPr lang="en-US" sz="1200" b="1" dirty="0">
                 <a:solidFill>
                   <a:srgbClr val="2A00FF"/>
                 </a:solidFill>
@@ -23810,7 +23815,7 @@
               <a:t>&lt;</a:t>
             </a:r>
             <a:r>
-              <a:rPr lang="en-US" sz="1400" b="1" dirty="0" err="1">
+              <a:rPr lang="en-US" sz="1200" b="1" dirty="0" err="1">
                 <a:solidFill>
                   <a:srgbClr val="2A00FF"/>
                 </a:solidFill>
@@ -23819,7 +23824,7 @@
               <a:t>stdint.h</a:t>
             </a:r>
             <a:r>
-              <a:rPr lang="en-US" sz="1400" b="1" dirty="0">
+              <a:rPr lang="en-US" sz="1200" b="1" dirty="0">
                 <a:solidFill>
                   <a:srgbClr val="2A00FF"/>
                 </a:solidFill>
@@ -23842,7 +23847,7 @@
               <a:buNone/>
             </a:pPr>
             <a:r>
-              <a:rPr lang="en-US" sz="1400" b="1" dirty="0">
+              <a:rPr lang="en-US" sz="1200" b="1" dirty="0">
                 <a:solidFill>
                   <a:srgbClr val="7F0055"/>
                 </a:solidFill>
@@ -23851,7 +23856,7 @@
               <a:t>#include</a:t>
             </a:r>
             <a:r>
-              <a:rPr lang="en-US" sz="1400" b="1" dirty="0">
+              <a:rPr lang="en-US" sz="1200" b="1" dirty="0">
                 <a:solidFill>
                   <a:srgbClr val="000000"/>
                 </a:solidFill>
@@ -23860,7 +23865,7 @@
               <a:t> </a:t>
             </a:r>
             <a:r>
-              <a:rPr lang="en-US" sz="1400" b="1" dirty="0">
+              <a:rPr lang="en-US" sz="1200" b="1" dirty="0">
                 <a:solidFill>
                   <a:srgbClr val="2A00FF"/>
                 </a:solidFill>
@@ -23869,7 +23874,7 @@
               <a:t>"</a:t>
             </a:r>
             <a:r>
-              <a:rPr lang="en-US" sz="1400" b="1" dirty="0" err="1">
+              <a:rPr lang="en-US" sz="1200" b="1" dirty="0" err="1">
                 <a:solidFill>
                   <a:srgbClr val="2A00FF"/>
                 </a:solidFill>
@@ -23878,7 +23883,7 @@
               <a:t>cpu_types.h</a:t>
             </a:r>
             <a:r>
-              <a:rPr lang="en-US" sz="1400" b="1" dirty="0">
+              <a:rPr lang="en-US" sz="1200" b="1" dirty="0">
                 <a:solidFill>
                   <a:srgbClr val="2A00FF"/>
                 </a:solidFill>
@@ -23900,7 +23905,7 @@
               </a:spcAft>
               <a:buNone/>
             </a:pPr>
-            <a:endParaRPr lang="en-US" sz="1400" dirty="0">
+            <a:endParaRPr lang="en-US" sz="1200" dirty="0">
               <a:latin typeface="Consolas" panose="020B0609020204030204" pitchFamily="49" charset="0"/>
             </a:endParaRPr>
           </a:p>
@@ -23918,7 +23923,7 @@
               <a:buNone/>
             </a:pPr>
             <a:r>
-              <a:rPr lang="en-US" sz="1400" b="1" dirty="0">
+              <a:rPr lang="en-US" sz="1200" b="1" dirty="0">
                 <a:solidFill>
                   <a:srgbClr val="7F0055"/>
                 </a:solidFill>
@@ -23927,13 +23932,13 @@
               <a:t>#define</a:t>
             </a:r>
             <a:r>
-              <a:rPr lang="en-US" sz="1400" b="1" dirty="0">
+              <a:rPr lang="en-US" sz="1200" b="1" dirty="0">
                 <a:solidFill>
                   <a:srgbClr val="000000"/>
                 </a:solidFill>
                 <a:latin typeface="Consolas" panose="020B0609020204030204" pitchFamily="49" charset="0"/>
               </a:rPr>
-              <a:t> AND2_GATE_BASE_ADDR0x70002000UL</a:t>
+              <a:t> ADD2_BASE_ADDR  0x70002000UL</a:t>
             </a:r>
           </a:p>
           <a:p>
@@ -23949,7 +23954,7 @@
               </a:spcAft>
               <a:buNone/>
             </a:pPr>
-            <a:endParaRPr lang="en-US" sz="1400" dirty="0">
+            <a:endParaRPr lang="en-US" sz="1200" dirty="0">
               <a:latin typeface="Consolas" panose="020B0609020204030204" pitchFamily="49" charset="0"/>
             </a:endParaRPr>
           </a:p>
@@ -23967,7 +23972,7 @@
               <a:buNone/>
             </a:pPr>
             <a:r>
-              <a:rPr lang="en-US" sz="1400" b="1" dirty="0">
+              <a:rPr lang="en-US" sz="1200" b="1" dirty="0">
                 <a:solidFill>
                   <a:srgbClr val="7F0055"/>
                 </a:solidFill>
@@ -23976,7 +23981,7 @@
               <a:t>typedef</a:t>
             </a:r>
             <a:r>
-              <a:rPr lang="en-US" sz="1400" b="1" dirty="0">
+              <a:rPr lang="en-US" sz="1200" b="1" dirty="0">
                 <a:solidFill>
                   <a:srgbClr val="000000"/>
                 </a:solidFill>
@@ -23985,7 +23990,7 @@
               <a:t> </a:t>
             </a:r>
             <a:r>
-              <a:rPr lang="en-US" sz="1400" b="1" dirty="0">
+              <a:rPr lang="en-US" sz="1200" b="1" dirty="0">
                 <a:solidFill>
                   <a:srgbClr val="7F0055"/>
                 </a:solidFill>
@@ -23994,7 +23999,7 @@
               <a:t>struct</a:t>
             </a:r>
             <a:r>
-              <a:rPr lang="en-US" sz="1400" b="1" dirty="0">
+              <a:rPr lang="en-US" sz="1200" b="1" dirty="0">
                 <a:solidFill>
                   <a:srgbClr val="000000"/>
                 </a:solidFill>
@@ -24003,16 +24008,16 @@
               <a:t> </a:t>
             </a:r>
             <a:r>
-              <a:rPr lang="en-US" sz="1400" b="1" dirty="0">
+              <a:rPr lang="en-US" sz="1200" b="1" dirty="0">
                 <a:solidFill>
                   <a:srgbClr val="005032"/>
                 </a:solidFill>
                 <a:latin typeface="Consolas" panose="020B0609020204030204" pitchFamily="49" charset="0"/>
               </a:rPr>
-              <a:t>and2_gate_instance</a:t>
-            </a:r>
-            <a:r>
-              <a:rPr lang="en-US" sz="1400" b="1" dirty="0">
+              <a:t>add2_instance</a:t>
+            </a:r>
+            <a:r>
+              <a:rPr lang="en-US" sz="1200" b="1" dirty="0">
                 <a:solidFill>
                   <a:srgbClr val="000000"/>
                 </a:solidFill>
@@ -24021,16 +24026,16 @@
               <a:t> </a:t>
             </a:r>
             <a:r>
-              <a:rPr lang="en-US" sz="1400" b="1" dirty="0">
+              <a:rPr lang="en-US" sz="1200" b="1" dirty="0">
                 <a:solidFill>
                   <a:srgbClr val="005032"/>
                 </a:solidFill>
                 <a:latin typeface="Consolas" panose="020B0609020204030204" pitchFamily="49" charset="0"/>
               </a:rPr>
-              <a:t>and2_gate_instance_t</a:t>
-            </a:r>
-            <a:r>
-              <a:rPr lang="en-US" sz="1400" b="1" dirty="0">
+              <a:t>add2_instance_t</a:t>
+            </a:r>
+            <a:r>
+              <a:rPr lang="en-US" sz="1200" b="1" dirty="0">
                 <a:solidFill>
                   <a:srgbClr val="000000"/>
                 </a:solidFill>
@@ -24052,7 +24057,7 @@
               </a:spcAft>
               <a:buNone/>
             </a:pPr>
-            <a:endParaRPr lang="en-US" sz="1400" dirty="0">
+            <a:endParaRPr lang="en-US" sz="1200" dirty="0">
               <a:latin typeface="Consolas" panose="020B0609020204030204" pitchFamily="49" charset="0"/>
             </a:endParaRPr>
           </a:p>
@@ -24070,7 +24075,7 @@
               <a:buNone/>
             </a:pPr>
             <a:r>
-              <a:rPr lang="en-US" sz="1400" b="1" dirty="0">
+              <a:rPr lang="en-US" sz="1200" b="1" dirty="0">
                 <a:solidFill>
                   <a:srgbClr val="7F0055"/>
                 </a:solidFill>
@@ -24079,7 +24084,7 @@
               <a:t>struct</a:t>
             </a:r>
             <a:r>
-              <a:rPr lang="en-US" sz="1400" b="1" dirty="0">
+              <a:rPr lang="en-US" sz="1200" b="1" dirty="0">
                 <a:solidFill>
                   <a:srgbClr val="000000"/>
                 </a:solidFill>
@@ -24088,30 +24093,16 @@
               <a:t> </a:t>
             </a:r>
             <a:r>
-              <a:rPr lang="en-US" sz="1400" b="1" dirty="0">
+              <a:rPr lang="en-US" sz="1200" b="1" dirty="0">
                 <a:solidFill>
                   <a:srgbClr val="005032"/>
                 </a:solidFill>
                 <a:latin typeface="Consolas" panose="020B0609020204030204" pitchFamily="49" charset="0"/>
               </a:rPr>
-              <a:t>and2_gate_instance</a:t>
-            </a:r>
-          </a:p>
-          <a:p>
-            <a:pPr marL="0" indent="0" algn="l">
-              <a:lnSpc>
-                <a:spcPct val="100000"/>
-              </a:lnSpc>
-              <a:spcBef>
-                <a:spcPts val="0"/>
-              </a:spcBef>
-              <a:spcAft>
-                <a:spcPts val="0"/>
-              </a:spcAft>
-              <a:buNone/>
-            </a:pPr>
-            <a:r>
-              <a:rPr lang="en-US" sz="1400" dirty="0">
+              <a:t>add2_instance </a:t>
+            </a:r>
+            <a:r>
+              <a:rPr lang="en-US" sz="1200" dirty="0">
                 <a:solidFill>
                   <a:srgbClr val="000000"/>
                 </a:solidFill>
@@ -24121,7 +24112,7 @@
             </a:r>
           </a:p>
           <a:p>
-            <a:pPr marL="457200" indent="0" algn="l">
+            <a:pPr marL="225425" indent="0" algn="l">
               <a:lnSpc>
                 <a:spcPct val="100000"/>
               </a:lnSpc>
@@ -24134,7 +24125,7 @@
               <a:buNone/>
             </a:pPr>
             <a:r>
-              <a:rPr lang="en-US" sz="1400" dirty="0" err="1">
+              <a:rPr lang="en-US" sz="1200" dirty="0" err="1">
                 <a:solidFill>
                   <a:srgbClr val="005032"/>
                 </a:solidFill>
@@ -24143,16 +24134,16 @@
               <a:t>addr_t</a:t>
             </a:r>
             <a:r>
-              <a:rPr lang="en-US" sz="1400" dirty="0">
+              <a:rPr lang="en-US" sz="1200" dirty="0">
                 <a:solidFill>
                   <a:srgbClr val="000000"/>
                 </a:solidFill>
                 <a:latin typeface="Consolas" panose="020B0609020204030204" pitchFamily="49" charset="0"/>
               </a:rPr>
-              <a:t>              </a:t>
-            </a:r>
-            <a:r>
-              <a:rPr lang="en-US" sz="1400" dirty="0" err="1">
+              <a:t> </a:t>
+            </a:r>
+            <a:r>
+              <a:rPr lang="en-US" sz="1200" dirty="0" err="1">
                 <a:solidFill>
                   <a:srgbClr val="0000C0"/>
                 </a:solidFill>
@@ -24161,7 +24152,7 @@
               <a:t>base_addr</a:t>
             </a:r>
             <a:r>
-              <a:rPr lang="en-US" sz="1400" dirty="0">
+              <a:rPr lang="en-US" sz="1200" dirty="0">
                 <a:solidFill>
                   <a:srgbClr val="000000"/>
                 </a:solidFill>
@@ -24184,7 +24175,7 @@
               <a:buNone/>
             </a:pPr>
             <a:r>
-              <a:rPr lang="en-US" sz="1400" dirty="0">
+              <a:rPr lang="en-US" sz="1200" dirty="0">
                 <a:solidFill>
                   <a:srgbClr val="000000"/>
                 </a:solidFill>
@@ -24206,7 +24197,7 @@
               </a:spcAft>
               <a:buNone/>
             </a:pPr>
-            <a:endParaRPr lang="en-US" sz="1400" dirty="0">
+            <a:endParaRPr lang="en-US" sz="1200" dirty="0">
               <a:latin typeface="Consolas" panose="020B0609020204030204" pitchFamily="49" charset="0"/>
             </a:endParaRPr>
           </a:p>
@@ -24224,7 +24215,7 @@
               <a:buNone/>
             </a:pPr>
             <a:r>
-              <a:rPr lang="en-US" sz="1400" b="1" dirty="0">
+              <a:rPr lang="en-US" sz="1200" b="1" dirty="0">
                 <a:solidFill>
                   <a:srgbClr val="7F0055"/>
                 </a:solidFill>
@@ -24233,30 +24224,16 @@
               <a:t>void</a:t>
             </a:r>
             <a:r>
-              <a:rPr lang="en-US" sz="1400" b="1" dirty="0">
+              <a:rPr lang="en-US" sz="1200" b="1" dirty="0">
                 <a:solidFill>
                   <a:srgbClr val="000000"/>
                 </a:solidFill>
                 <a:latin typeface="Consolas" panose="020B0609020204030204" pitchFamily="49" charset="0"/>
               </a:rPr>
-              <a:t> AND2_GATE_init</a:t>
-            </a:r>
-          </a:p>
-          <a:p>
-            <a:pPr marL="0" indent="0" algn="l">
-              <a:lnSpc>
-                <a:spcPct val="100000"/>
-              </a:lnSpc>
-              <a:spcBef>
-                <a:spcPts val="0"/>
-              </a:spcBef>
-              <a:spcAft>
-                <a:spcPts val="0"/>
-              </a:spcAft>
-              <a:buNone/>
-            </a:pPr>
-            <a:r>
-              <a:rPr lang="en-US" sz="1400" dirty="0">
+              <a:t> ADD2_init </a:t>
+            </a:r>
+            <a:r>
+              <a:rPr lang="en-US" sz="1200" dirty="0">
                 <a:solidFill>
                   <a:srgbClr val="000000"/>
                 </a:solidFill>
@@ -24266,7 +24243,7 @@
             </a:r>
           </a:p>
           <a:p>
-            <a:pPr marL="457200" indent="0" algn="l">
+            <a:pPr marL="225425" indent="0" algn="l">
               <a:lnSpc>
                 <a:spcPct val="100000"/>
               </a:lnSpc>
@@ -24279,26 +24256,26 @@
               <a:buNone/>
             </a:pPr>
             <a:r>
-              <a:rPr lang="en-US" sz="1400" dirty="0">
+              <a:rPr lang="en-US" sz="1200" dirty="0">
                 <a:solidFill>
                   <a:srgbClr val="005032"/>
                 </a:solidFill>
                 <a:latin typeface="Consolas" panose="020B0609020204030204" pitchFamily="49" charset="0"/>
               </a:rPr>
-              <a:t>and2_gate_instance_t</a:t>
-            </a:r>
-            <a:r>
-              <a:rPr lang="en-US" sz="1400" dirty="0">
+              <a:t>add2_instance_t</a:t>
+            </a:r>
+            <a:r>
+              <a:rPr lang="en-US" sz="1200" dirty="0">
                 <a:solidFill>
                   <a:srgbClr val="000000"/>
                 </a:solidFill>
                 <a:latin typeface="Consolas" panose="020B0609020204030204" pitchFamily="49" charset="0"/>
               </a:rPr>
-              <a:t> *   this_and2_gate,</a:t>
-            </a:r>
-          </a:p>
-          <a:p>
-            <a:pPr marL="457200" indent="0" algn="l">
+              <a:t> * this_add2,</a:t>
+            </a:r>
+          </a:p>
+          <a:p>
+            <a:pPr marL="225425" indent="0" algn="l">
               <a:lnSpc>
                 <a:spcPct val="100000"/>
               </a:lnSpc>
@@ -24311,7 +24288,7 @@
               <a:buNone/>
             </a:pPr>
             <a:r>
-              <a:rPr lang="en-US" sz="1400" dirty="0" err="1">
+              <a:rPr lang="en-US" sz="1200" dirty="0" err="1">
                 <a:solidFill>
                   <a:srgbClr val="005032"/>
                 </a:solidFill>
@@ -24320,7 +24297,7 @@
               <a:t>addr_t</a:t>
             </a:r>
             <a:r>
-              <a:rPr lang="en-US" sz="1400" dirty="0">
+              <a:rPr lang="en-US" sz="1200" dirty="0">
                 <a:solidFill>
                   <a:srgbClr val="000000"/>
                 </a:solidFill>
@@ -24329,7 +24306,7 @@
               <a:t> </a:t>
             </a:r>
             <a:r>
-              <a:rPr lang="en-US" sz="1400" dirty="0" err="1">
+              <a:rPr lang="en-US" sz="1200" dirty="0" err="1">
                 <a:solidFill>
                   <a:srgbClr val="000000"/>
                 </a:solidFill>
@@ -24337,7 +24314,7 @@
               </a:rPr>
               <a:t>base_addr</a:t>
             </a:r>
-            <a:endParaRPr lang="en-US" sz="1400" dirty="0">
+            <a:endParaRPr lang="en-US" sz="1200" dirty="0">
               <a:solidFill>
                 <a:srgbClr val="000000"/>
               </a:solidFill>
@@ -24358,7 +24335,7 @@
               <a:buNone/>
             </a:pPr>
             <a:r>
-              <a:rPr lang="en-US" sz="1400" dirty="0">
+              <a:rPr lang="en-US" sz="1200" dirty="0">
                 <a:solidFill>
                   <a:srgbClr val="000000"/>
                 </a:solidFill>
@@ -24380,48 +24357,8 @@
               </a:spcAft>
               <a:buNone/>
             </a:pPr>
-            <a:endParaRPr lang="en-US" sz="1400" dirty="0">
-              <a:solidFill>
-                <a:srgbClr val="000000"/>
-              </a:solidFill>
-              <a:latin typeface="Consolas" panose="020B0609020204030204" pitchFamily="49" charset="0"/>
-            </a:endParaRPr>
-          </a:p>
-          <a:p>
-            <a:pPr marL="0" indent="0" algn="l">
-              <a:lnSpc>
-                <a:spcPct val="100000"/>
-              </a:lnSpc>
-              <a:spcBef>
-                <a:spcPts val="0"/>
-              </a:spcBef>
-              <a:spcAft>
-                <a:spcPts val="0"/>
-              </a:spcAft>
-              <a:buNone/>
-            </a:pPr>
-            <a:endParaRPr lang="en-US" sz="1400" dirty="0">
-              <a:solidFill>
-                <a:srgbClr val="000000"/>
-              </a:solidFill>
-              <a:latin typeface="Consolas" panose="020B0609020204030204" pitchFamily="49" charset="0"/>
-            </a:endParaRPr>
-          </a:p>
-          <a:p>
-            <a:pPr marL="0" indent="0" algn="l">
-              <a:lnSpc>
-                <a:spcPct val="100000"/>
-              </a:lnSpc>
-              <a:spcBef>
-                <a:spcPts val="0"/>
-              </a:spcBef>
-              <a:spcAft>
-                <a:spcPts val="0"/>
-              </a:spcAft>
-              <a:buNone/>
-            </a:pPr>
-            <a:r>
-              <a:rPr lang="en-US" sz="1400" b="1" dirty="0">
+            <a:r>
+              <a:rPr lang="en-US" sz="1200" b="1" dirty="0">
                 <a:solidFill>
                   <a:srgbClr val="7F0055"/>
                 </a:solidFill>
@@ -24430,7 +24367,7 @@
               <a:t>void</a:t>
             </a:r>
             <a:r>
-              <a:rPr lang="en-US" sz="1400" b="1" dirty="0">
+              <a:rPr lang="en-US" sz="1200" b="1" dirty="0">
                 <a:solidFill>
                   <a:srgbClr val="000000"/>
                 </a:solidFill>
@@ -24439,7 +24376,7 @@
               <a:t> </a:t>
             </a:r>
             <a:r>
-              <a:rPr lang="en-US" sz="1400" b="1" dirty="0" err="1">
+              <a:rPr lang="en-US" sz="1200" b="1" dirty="0" err="1">
                 <a:solidFill>
                   <a:srgbClr val="000000"/>
                 </a:solidFill>
@@ -24447,28 +24384,17 @@
               </a:rPr>
               <a:t>set_A</a:t>
             </a:r>
-            <a:endParaRPr lang="en-US" sz="1400" b="1" dirty="0">
-              <a:solidFill>
-                <a:srgbClr val="000000"/>
-              </a:solidFill>
-              <a:latin typeface="Consolas" panose="020B0609020204030204" pitchFamily="49" charset="0"/>
-            </a:endParaRPr>
-          </a:p>
-          <a:p>
-            <a:pPr marL="0" indent="0" algn="l">
-              <a:lnSpc>
-                <a:spcPct val="100000"/>
-              </a:lnSpc>
-              <a:spcBef>
-                <a:spcPts val="0"/>
-              </a:spcBef>
-              <a:spcAft>
-                <a:spcPts val="0"/>
-              </a:spcAft>
-              <a:buNone/>
-            </a:pPr>
-            <a:r>
-              <a:rPr lang="en-US" sz="1400" dirty="0">
+            <a:r>
+              <a:rPr lang="en-US" sz="1200" b="1" dirty="0">
+                <a:solidFill>
+                  <a:srgbClr val="000000"/>
+                </a:solidFill>
+                <a:latin typeface="Consolas" panose="020B0609020204030204" pitchFamily="49" charset="0"/>
+              </a:rPr>
+              <a:t> </a:t>
+            </a:r>
+            <a:r>
+              <a:rPr lang="en-US" sz="1200" dirty="0">
                 <a:solidFill>
                   <a:srgbClr val="000000"/>
                 </a:solidFill>
@@ -24478,7 +24404,7 @@
             </a:r>
           </a:p>
           <a:p>
-            <a:pPr marL="457200" indent="0" algn="l">
+            <a:pPr marL="225425" indent="0" algn="l">
               <a:lnSpc>
                 <a:spcPct val="100000"/>
               </a:lnSpc>
@@ -24491,26 +24417,26 @@
               <a:buNone/>
             </a:pPr>
             <a:r>
-              <a:rPr lang="en-US" sz="1400" dirty="0">
+              <a:rPr lang="en-US" sz="1200" dirty="0">
                 <a:solidFill>
                   <a:srgbClr val="005032"/>
                 </a:solidFill>
                 <a:latin typeface="Consolas" panose="020B0609020204030204" pitchFamily="49" charset="0"/>
               </a:rPr>
-              <a:t>and2_gate_instance_t</a:t>
-            </a:r>
-            <a:r>
-              <a:rPr lang="en-US" sz="1400" dirty="0">
+              <a:t>add2_instance_t</a:t>
+            </a:r>
+            <a:r>
+              <a:rPr lang="en-US" sz="1200" dirty="0">
                 <a:solidFill>
                   <a:srgbClr val="000000"/>
                 </a:solidFill>
                 <a:latin typeface="Consolas" panose="020B0609020204030204" pitchFamily="49" charset="0"/>
               </a:rPr>
-              <a:t> *   this_and2_gate,</a:t>
-            </a:r>
-          </a:p>
-          <a:p>
-            <a:pPr marL="457200" indent="0" algn="l">
+              <a:t> * this_add2,</a:t>
+            </a:r>
+          </a:p>
+          <a:p>
+            <a:pPr marL="225425" indent="0" algn="l">
               <a:lnSpc>
                 <a:spcPct val="100000"/>
               </a:lnSpc>
@@ -24523,7 +24449,7 @@
               <a:buNone/>
             </a:pPr>
             <a:r>
-              <a:rPr lang="en-US" sz="1400" dirty="0">
+              <a:rPr lang="en-US" sz="1200" dirty="0">
                 <a:solidFill>
                   <a:srgbClr val="005032"/>
                 </a:solidFill>
@@ -24532,7 +24458,7 @@
               <a:t>uint8_t</a:t>
             </a:r>
             <a:r>
-              <a:rPr lang="en-US" sz="1400" dirty="0">
+              <a:rPr lang="en-US" sz="1200" dirty="0">
                 <a:solidFill>
                   <a:srgbClr val="000000"/>
                 </a:solidFill>
@@ -24541,7 +24467,7 @@
               <a:t> </a:t>
             </a:r>
             <a:r>
-              <a:rPr lang="en-US" sz="1400" dirty="0" err="1">
+              <a:rPr lang="en-US" sz="1200" dirty="0" err="1">
                 <a:solidFill>
                   <a:srgbClr val="000000"/>
                 </a:solidFill>
@@ -24549,7 +24475,7 @@
               </a:rPr>
               <a:t>aValue</a:t>
             </a:r>
-            <a:endParaRPr lang="en-US" sz="1400" dirty="0">
+            <a:endParaRPr lang="en-US" sz="1200" dirty="0">
               <a:solidFill>
                 <a:srgbClr val="000000"/>
               </a:solidFill>
@@ -24570,7 +24496,7 @@
               <a:buNone/>
             </a:pPr>
             <a:r>
-              <a:rPr lang="en-US" sz="1400" dirty="0">
+              <a:rPr lang="en-US" sz="1200" dirty="0">
                 <a:solidFill>
                   <a:srgbClr val="000000"/>
                 </a:solidFill>
@@ -24592,8 +24518,108 @@
               </a:spcAft>
               <a:buNone/>
             </a:pPr>
-            <a:r>
-              <a:rPr lang="en-US" sz="1400" b="1" dirty="0">
+            <a:endParaRPr lang="en-US" sz="1200" dirty="0">
+              <a:solidFill>
+                <a:srgbClr val="000000"/>
+              </a:solidFill>
+              <a:latin typeface="Consolas" panose="020B0609020204030204" pitchFamily="49" charset="0"/>
+            </a:endParaRPr>
+          </a:p>
+          <a:p>
+            <a:pPr marL="0" indent="0" algn="l">
+              <a:lnSpc>
+                <a:spcPct val="100000"/>
+              </a:lnSpc>
+              <a:spcBef>
+                <a:spcPts val="0"/>
+              </a:spcBef>
+              <a:spcAft>
+                <a:spcPts val="0"/>
+              </a:spcAft>
+              <a:buNone/>
+            </a:pPr>
+            <a:endParaRPr lang="en-US" sz="1200" dirty="0">
+              <a:solidFill>
+                <a:srgbClr val="000000"/>
+              </a:solidFill>
+              <a:latin typeface="Consolas" panose="020B0609020204030204" pitchFamily="49" charset="0"/>
+            </a:endParaRPr>
+          </a:p>
+          <a:p>
+            <a:pPr marL="0" indent="0" algn="l">
+              <a:lnSpc>
+                <a:spcPct val="100000"/>
+              </a:lnSpc>
+              <a:spcBef>
+                <a:spcPts val="0"/>
+              </a:spcBef>
+              <a:spcAft>
+                <a:spcPts val="0"/>
+              </a:spcAft>
+              <a:buNone/>
+            </a:pPr>
+            <a:endParaRPr lang="en-US" sz="1200" dirty="0">
+              <a:solidFill>
+                <a:srgbClr val="000000"/>
+              </a:solidFill>
+              <a:latin typeface="Consolas" panose="020B0609020204030204" pitchFamily="49" charset="0"/>
+            </a:endParaRPr>
+          </a:p>
+          <a:p>
+            <a:pPr marL="0" indent="0" algn="l">
+              <a:lnSpc>
+                <a:spcPct val="100000"/>
+              </a:lnSpc>
+              <a:spcBef>
+                <a:spcPts val="0"/>
+              </a:spcBef>
+              <a:spcAft>
+                <a:spcPts val="0"/>
+              </a:spcAft>
+              <a:buNone/>
+            </a:pPr>
+            <a:endParaRPr lang="en-US" sz="1200" dirty="0">
+              <a:solidFill>
+                <a:srgbClr val="000000"/>
+              </a:solidFill>
+              <a:latin typeface="Consolas" panose="020B0609020204030204" pitchFamily="49" charset="0"/>
+            </a:endParaRPr>
+          </a:p>
+          <a:p>
+            <a:pPr marL="0" indent="0" algn="l">
+              <a:lnSpc>
+                <a:spcPct val="100000"/>
+              </a:lnSpc>
+              <a:spcBef>
+                <a:spcPts val="0"/>
+              </a:spcBef>
+              <a:spcAft>
+                <a:spcPts val="0"/>
+              </a:spcAft>
+              <a:buNone/>
+            </a:pPr>
+            <a:endParaRPr lang="en-US" sz="1200" dirty="0">
+              <a:solidFill>
+                <a:srgbClr val="000000"/>
+              </a:solidFill>
+              <a:latin typeface="Consolas" panose="020B0609020204030204" pitchFamily="49" charset="0"/>
+            </a:endParaRPr>
+          </a:p>
+          <a:p>
+            <a:pPr marL="0" indent="0" algn="l">
+              <a:lnSpc>
+                <a:spcPct val="100000"/>
+              </a:lnSpc>
+              <a:spcBef>
+                <a:spcPts val="0"/>
+              </a:spcBef>
+              <a:spcAft>
+                <a:spcPts val="0"/>
+              </a:spcAft>
+              <a:buNone/>
+            </a:pPr>
+            <a:r>
+              <a:rPr lang="en-US" sz="1200" b="1" dirty="0">
                 <a:solidFill>
                   <a:srgbClr val="7F0055"/>
                 </a:solidFill>
@@ -24602,7 +24628,7 @@
               <a:t>void</a:t>
             </a:r>
             <a:r>
-              <a:rPr lang="en-US" sz="1400" b="1" dirty="0">
+              <a:rPr lang="en-US" sz="1200" b="1" dirty="0">
                 <a:solidFill>
                   <a:srgbClr val="000000"/>
                 </a:solidFill>
@@ -24611,7 +24637,7 @@
               <a:t> </a:t>
             </a:r>
             <a:r>
-              <a:rPr lang="en-US" sz="1400" b="1" dirty="0" err="1">
+              <a:rPr lang="en-US" sz="1200" b="1" dirty="0" err="1">
                 <a:solidFill>
                   <a:srgbClr val="000000"/>
                 </a:solidFill>
@@ -24619,28 +24645,17 @@
               </a:rPr>
               <a:t>set_B</a:t>
             </a:r>
-            <a:endParaRPr lang="en-US" sz="1400" b="1" dirty="0">
-              <a:solidFill>
-                <a:srgbClr val="000000"/>
-              </a:solidFill>
-              <a:latin typeface="Consolas" panose="020B0609020204030204" pitchFamily="49" charset="0"/>
-            </a:endParaRPr>
-          </a:p>
-          <a:p>
-            <a:pPr marL="0" indent="0" algn="l">
-              <a:lnSpc>
-                <a:spcPct val="100000"/>
-              </a:lnSpc>
-              <a:spcBef>
-                <a:spcPts val="0"/>
-              </a:spcBef>
-              <a:spcAft>
-                <a:spcPts val="0"/>
-              </a:spcAft>
-              <a:buNone/>
-            </a:pPr>
-            <a:r>
-              <a:rPr lang="en-US" sz="1400" dirty="0">
+            <a:r>
+              <a:rPr lang="en-US" sz="1200" b="1" dirty="0">
+                <a:solidFill>
+                  <a:srgbClr val="000000"/>
+                </a:solidFill>
+                <a:latin typeface="Consolas" panose="020B0609020204030204" pitchFamily="49" charset="0"/>
+              </a:rPr>
+              <a:t> </a:t>
+            </a:r>
+            <a:r>
+              <a:rPr lang="en-US" sz="1200" dirty="0">
                 <a:solidFill>
                   <a:srgbClr val="000000"/>
                 </a:solidFill>
@@ -24650,7 +24665,7 @@
             </a:r>
           </a:p>
           <a:p>
-            <a:pPr marL="457200" indent="0" algn="l">
+            <a:pPr marL="225425" indent="0" algn="l">
               <a:lnSpc>
                 <a:spcPct val="100000"/>
               </a:lnSpc>
@@ -24663,26 +24678,26 @@
               <a:buNone/>
             </a:pPr>
             <a:r>
-              <a:rPr lang="en-US" sz="1400" dirty="0">
+              <a:rPr lang="en-US" sz="1200" dirty="0">
                 <a:solidFill>
                   <a:srgbClr val="005032"/>
                 </a:solidFill>
                 <a:latin typeface="Consolas" panose="020B0609020204030204" pitchFamily="49" charset="0"/>
               </a:rPr>
-              <a:t>and2_gate_instance_t</a:t>
-            </a:r>
-            <a:r>
-              <a:rPr lang="en-US" sz="1400" dirty="0">
+              <a:t>add2_instance_t</a:t>
+            </a:r>
+            <a:r>
+              <a:rPr lang="en-US" sz="1200" dirty="0">
                 <a:solidFill>
                   <a:srgbClr val="000000"/>
                 </a:solidFill>
                 <a:latin typeface="Consolas" panose="020B0609020204030204" pitchFamily="49" charset="0"/>
               </a:rPr>
-              <a:t> *   this_and2_gate,</a:t>
-            </a:r>
-          </a:p>
-          <a:p>
-            <a:pPr marL="457200" indent="0" algn="l">
+              <a:t> * this_add2,</a:t>
+            </a:r>
+          </a:p>
+          <a:p>
+            <a:pPr marL="225425" indent="0" algn="l">
               <a:lnSpc>
                 <a:spcPct val="100000"/>
               </a:lnSpc>
@@ -24695,7 +24710,7 @@
               <a:buNone/>
             </a:pPr>
             <a:r>
-              <a:rPr lang="en-US" sz="1400" dirty="0">
+              <a:rPr lang="en-US" sz="1200" dirty="0">
                 <a:solidFill>
                   <a:srgbClr val="005032"/>
                 </a:solidFill>
@@ -24704,7 +24719,7 @@
               <a:t>uint8_t</a:t>
             </a:r>
             <a:r>
-              <a:rPr lang="en-US" sz="1400" dirty="0">
+              <a:rPr lang="en-US" sz="1200" dirty="0">
                 <a:solidFill>
                   <a:srgbClr val="000000"/>
                 </a:solidFill>
@@ -24713,7 +24728,7 @@
               <a:t> </a:t>
             </a:r>
             <a:r>
-              <a:rPr lang="en-US" sz="1400" dirty="0" err="1">
+              <a:rPr lang="en-US" sz="1200" dirty="0" err="1">
                 <a:solidFill>
                   <a:srgbClr val="000000"/>
                 </a:solidFill>
@@ -24721,7 +24736,7 @@
               </a:rPr>
               <a:t>bValue</a:t>
             </a:r>
-            <a:endParaRPr lang="en-US" sz="1400" dirty="0">
+            <a:endParaRPr lang="en-US" sz="1200" dirty="0">
               <a:solidFill>
                 <a:srgbClr val="000000"/>
               </a:solidFill>
@@ -24742,7 +24757,7 @@
               <a:buNone/>
             </a:pPr>
             <a:r>
-              <a:rPr lang="en-US" sz="1400" dirty="0">
+              <a:rPr lang="en-US" sz="1200" dirty="0">
                 <a:solidFill>
                   <a:srgbClr val="000000"/>
                 </a:solidFill>
@@ -24765,7 +24780,7 @@
               <a:buNone/>
             </a:pPr>
             <a:r>
-              <a:rPr lang="en-US" sz="1400" dirty="0">
+              <a:rPr lang="en-US" sz="1200" dirty="0">
                 <a:solidFill>
                   <a:srgbClr val="005032"/>
                 </a:solidFill>
@@ -24774,7 +24789,7 @@
               <a:t>uint8_t</a:t>
             </a:r>
             <a:r>
-              <a:rPr lang="en-US" sz="1400" dirty="0">
+              <a:rPr lang="en-US" sz="1200" dirty="0">
                 <a:solidFill>
                   <a:srgbClr val="000000"/>
                 </a:solidFill>
@@ -24783,7 +24798,7 @@
               <a:t> </a:t>
             </a:r>
             <a:r>
-              <a:rPr lang="en-US" sz="1400" b="1" dirty="0" err="1">
+              <a:rPr lang="en-US" sz="1200" b="1" dirty="0" err="1">
                 <a:solidFill>
                   <a:srgbClr val="000000"/>
                 </a:solidFill>
@@ -24791,28 +24806,17 @@
               </a:rPr>
               <a:t>get_ABX</a:t>
             </a:r>
-            <a:endParaRPr lang="en-US" sz="1400" b="1" dirty="0">
-              <a:solidFill>
-                <a:srgbClr val="000000"/>
-              </a:solidFill>
-              <a:latin typeface="Consolas" panose="020B0609020204030204" pitchFamily="49" charset="0"/>
-            </a:endParaRPr>
-          </a:p>
-          <a:p>
-            <a:pPr marL="0" indent="0" algn="l">
-              <a:lnSpc>
-                <a:spcPct val="100000"/>
-              </a:lnSpc>
-              <a:spcBef>
-                <a:spcPts val="0"/>
-              </a:spcBef>
-              <a:spcAft>
-                <a:spcPts val="0"/>
-              </a:spcAft>
-              <a:buNone/>
-            </a:pPr>
-            <a:r>
-              <a:rPr lang="en-US" sz="1400" dirty="0">
+            <a:r>
+              <a:rPr lang="en-US" sz="1200" b="1" dirty="0">
+                <a:solidFill>
+                  <a:srgbClr val="000000"/>
+                </a:solidFill>
+                <a:latin typeface="Consolas" panose="020B0609020204030204" pitchFamily="49" charset="0"/>
+              </a:rPr>
+              <a:t> </a:t>
+            </a:r>
+            <a:r>
+              <a:rPr lang="en-US" sz="1200" dirty="0">
                 <a:solidFill>
                   <a:srgbClr val="000000"/>
                 </a:solidFill>
@@ -24822,7 +24826,7 @@
             </a:r>
           </a:p>
           <a:p>
-            <a:pPr marL="457200" indent="0" algn="l">
+            <a:pPr marL="225425" indent="0" algn="l">
               <a:lnSpc>
                 <a:spcPct val="100000"/>
               </a:lnSpc>
@@ -24835,26 +24839,26 @@
               <a:buNone/>
             </a:pPr>
             <a:r>
-              <a:rPr lang="en-US" sz="1400" dirty="0">
+              <a:rPr lang="en-US" sz="1200" dirty="0">
                 <a:solidFill>
                   <a:srgbClr val="005032"/>
                 </a:solidFill>
                 <a:latin typeface="Consolas" panose="020B0609020204030204" pitchFamily="49" charset="0"/>
               </a:rPr>
-              <a:t>and2_gate_instance_t</a:t>
-            </a:r>
-            <a:r>
-              <a:rPr lang="en-US" sz="1400" dirty="0">
+              <a:t>add2_instance_t</a:t>
+            </a:r>
+            <a:r>
+              <a:rPr lang="en-US" sz="1200" dirty="0">
                 <a:solidFill>
                   <a:srgbClr val="000000"/>
                 </a:solidFill>
                 <a:latin typeface="Consolas" panose="020B0609020204030204" pitchFamily="49" charset="0"/>
               </a:rPr>
-              <a:t> *   this_and2_gate,</a:t>
-            </a:r>
-          </a:p>
-          <a:p>
-            <a:pPr marL="457200" indent="0" algn="l">
+              <a:t> * this_add2,</a:t>
+            </a:r>
+          </a:p>
+          <a:p>
+            <a:pPr marL="225425" indent="0" algn="l">
               <a:lnSpc>
                 <a:spcPct val="100000"/>
               </a:lnSpc>
@@ -24867,7 +24871,7 @@
               <a:buNone/>
             </a:pPr>
             <a:r>
-              <a:rPr lang="en-US" sz="1400" dirty="0">
+              <a:rPr lang="en-US" sz="1200" dirty="0">
                 <a:solidFill>
                   <a:srgbClr val="005032"/>
                 </a:solidFill>
@@ -24876,7 +24880,7 @@
               <a:t>uint8_t</a:t>
             </a:r>
             <a:r>
-              <a:rPr lang="en-US" sz="1400" dirty="0">
+              <a:rPr lang="en-US" sz="1200" dirty="0">
                 <a:solidFill>
                   <a:srgbClr val="000000"/>
                 </a:solidFill>
@@ -24899,7 +24903,7 @@
               <a:buNone/>
             </a:pPr>
             <a:r>
-              <a:rPr lang="en-US" sz="1400" dirty="0">
+              <a:rPr lang="en-US" sz="1200" dirty="0">
                 <a:solidFill>
                   <a:srgbClr val="000000"/>
                 </a:solidFill>
@@ -24909,22 +24913,6 @@
             </a:r>
           </a:p>
           <a:p>
-            <a:pPr algn="l">
-              <a:lnSpc>
-                <a:spcPct val="100000"/>
-              </a:lnSpc>
-              <a:spcBef>
-                <a:spcPts val="0"/>
-              </a:spcBef>
-              <a:spcAft>
-                <a:spcPts val="0"/>
-              </a:spcAft>
-            </a:pPr>
-            <a:endParaRPr lang="en-US" sz="1400" dirty="0">
-              <a:latin typeface="Consolas" panose="020B0609020204030204" pitchFamily="49" charset="0"/>
-            </a:endParaRPr>
-          </a:p>
-          <a:p>
             <a:pPr marL="0" indent="0" algn="l">
               <a:lnSpc>
                 <a:spcPct val="100000"/>
@@ -24937,8 +24925,25 @@
               </a:spcAft>
               <a:buNone/>
             </a:pPr>
-            <a:r>
-              <a:rPr lang="en-US" sz="1400" b="1" dirty="0">
+            <a:endParaRPr lang="en-US" sz="1200" dirty="0">
+              <a:latin typeface="Consolas" panose="020B0609020204030204" pitchFamily="49" charset="0"/>
+            </a:endParaRPr>
+          </a:p>
+          <a:p>
+            <a:pPr marL="0" indent="0" algn="l">
+              <a:lnSpc>
+                <a:spcPct val="100000"/>
+              </a:lnSpc>
+              <a:spcBef>
+                <a:spcPts val="0"/>
+              </a:spcBef>
+              <a:spcAft>
+                <a:spcPts val="0"/>
+              </a:spcAft>
+              <a:buNone/>
+            </a:pPr>
+            <a:r>
+              <a:rPr lang="en-US" sz="1200" b="1" dirty="0">
                 <a:solidFill>
                   <a:srgbClr val="7F0055"/>
                 </a:solidFill>
@@ -24947,7 +24952,7 @@
               <a:t>#endif</a:t>
             </a:r>
             <a:r>
-              <a:rPr lang="en-US" sz="1400" b="1" dirty="0">
+              <a:rPr lang="en-US" sz="1200" b="1" dirty="0">
                 <a:solidFill>
                   <a:srgbClr val="000000"/>
                 </a:solidFill>
@@ -24956,7 +24961,7 @@
               <a:t> </a:t>
             </a:r>
             <a:r>
-              <a:rPr lang="en-US" sz="1400" b="1" dirty="0">
+              <a:rPr lang="en-US" sz="1200" b="1" dirty="0">
                 <a:solidFill>
                   <a:srgbClr val="3F7F5F"/>
                 </a:solidFill>
@@ -24978,7 +24983,7 @@
               </a:spcAft>
               <a:buNone/>
             </a:pPr>
-            <a:endParaRPr lang="en-US" sz="1400" dirty="0"/>
+            <a:endParaRPr lang="en-US" sz="1200" dirty="0"/>
           </a:p>
         </p:txBody>
       </p:sp>
@@ -25086,7 +25091,7 @@
               <a:buNone/>
             </a:pPr>
             <a:r>
-              <a:rPr lang="en-US" sz="1400" b="1" dirty="0">
+              <a:rPr lang="en-US" sz="1200" b="1" dirty="0">
                 <a:solidFill>
                   <a:srgbClr val="7F0055"/>
                 </a:solidFill>
@@ -25095,7 +25100,7 @@
               <a:t>#ifndef</a:t>
             </a:r>
             <a:r>
-              <a:rPr lang="en-US" sz="1400" b="1" dirty="0">
+              <a:rPr lang="en-US" sz="1200" b="1" dirty="0">
                 <a:solidFill>
                   <a:srgbClr val="000000"/>
                 </a:solidFill>
@@ -25118,7 +25123,7 @@
               <a:buNone/>
             </a:pPr>
             <a:r>
-              <a:rPr lang="en-US" sz="1400" b="1" dirty="0">
+              <a:rPr lang="en-US" sz="1200" b="1" dirty="0">
                 <a:solidFill>
                   <a:srgbClr val="7F0055"/>
                 </a:solidFill>
@@ -25127,7 +25132,7 @@
               <a:t>#define</a:t>
             </a:r>
             <a:r>
-              <a:rPr lang="en-US" sz="1400" b="1" dirty="0">
+              <a:rPr lang="en-US" sz="1200" b="1" dirty="0">
                 <a:solidFill>
                   <a:srgbClr val="000000"/>
                 </a:solidFill>
@@ -25149,7 +25154,33 @@
               </a:spcAft>
               <a:buNone/>
             </a:pPr>
-            <a:endParaRPr lang="en-US" sz="1400" dirty="0">
+            <a:endParaRPr lang="en-US" sz="1200" dirty="0">
+              <a:latin typeface="Consolas" panose="020B0609020204030204" pitchFamily="49" charset="0"/>
+            </a:endParaRPr>
+          </a:p>
+          <a:p>
+            <a:pPr marL="0" indent="0">
+              <a:lnSpc>
+                <a:spcPct val="100000"/>
+              </a:lnSpc>
+              <a:spcBef>
+                <a:spcPts val="0"/>
+              </a:spcBef>
+              <a:spcAft>
+                <a:spcPts val="0"/>
+              </a:spcAft>
+              <a:buNone/>
+            </a:pPr>
+            <a:r>
+              <a:rPr lang="en-US" sz="1200" b="1" dirty="0">
+                <a:solidFill>
+                  <a:srgbClr val="3F7F5F"/>
+                </a:solidFill>
+                <a:latin typeface="Consolas" panose="020B0609020204030204" pitchFamily="49" charset="0"/>
+              </a:rPr>
+              <a:t>/* Register Addresses */</a:t>
+            </a:r>
+            <a:endParaRPr lang="en-US" sz="1200" dirty="0">
               <a:latin typeface="Consolas" panose="020B0609020204030204" pitchFamily="49" charset="0"/>
             </a:endParaRPr>
           </a:p>
@@ -25167,7 +25198,7 @@
               <a:buNone/>
             </a:pPr>
             <a:r>
-              <a:rPr lang="en-US" sz="1400" b="1" dirty="0">
+              <a:rPr lang="en-US" sz="1200" b="1" dirty="0">
                 <a:solidFill>
                   <a:srgbClr val="7F0055"/>
                 </a:solidFill>
@@ -25176,7 +25207,7 @@
               <a:t>#define</a:t>
             </a:r>
             <a:r>
-              <a:rPr lang="en-US" sz="1400" b="1" dirty="0">
+              <a:rPr lang="en-US" sz="1200" b="1" dirty="0">
                 <a:solidFill>
                   <a:srgbClr val="000000"/>
                 </a:solidFill>
@@ -25199,7 +25230,7 @@
               <a:buNone/>
             </a:pPr>
             <a:r>
-              <a:rPr lang="nn-NO" sz="1400" b="1" dirty="0">
+              <a:rPr lang="nn-NO" sz="1200" b="1" dirty="0">
                 <a:solidFill>
                   <a:srgbClr val="7F0055"/>
                 </a:solidFill>
@@ -25208,7 +25239,7 @@
               <a:t>#define</a:t>
             </a:r>
             <a:r>
-              <a:rPr lang="nn-NO" sz="1400" b="1" dirty="0">
+              <a:rPr lang="nn-NO" sz="1200" b="1" dirty="0">
                 <a:solidFill>
                   <a:srgbClr val="000000"/>
                 </a:solidFill>
@@ -25231,7 +25262,7 @@
               <a:buNone/>
             </a:pPr>
             <a:r>
-              <a:rPr lang="nn-NO" sz="1400" b="1" dirty="0">
+              <a:rPr lang="nn-NO" sz="1200" b="1" dirty="0">
                 <a:solidFill>
                   <a:srgbClr val="7F0055"/>
                 </a:solidFill>
@@ -25240,7 +25271,7 @@
               <a:t>#define</a:t>
             </a:r>
             <a:r>
-              <a:rPr lang="nn-NO" sz="1400" b="1" dirty="0">
+              <a:rPr lang="nn-NO" sz="1200" b="1" dirty="0">
                 <a:solidFill>
                   <a:srgbClr val="000000"/>
                 </a:solidFill>
@@ -25262,7 +25293,7 @@
               </a:spcAft>
               <a:buNone/>
             </a:pPr>
-            <a:endParaRPr lang="en-US" sz="1400" dirty="0">
+            <a:endParaRPr lang="en-US" sz="1200" dirty="0">
               <a:latin typeface="Consolas" panose="020B0609020204030204" pitchFamily="49" charset="0"/>
             </a:endParaRPr>
           </a:p>
@@ -25280,7 +25311,7 @@
               <a:buNone/>
             </a:pPr>
             <a:r>
-              <a:rPr lang="en-US" sz="1400" b="1" dirty="0">
+              <a:rPr lang="en-US" sz="1200" b="1" dirty="0">
                 <a:solidFill>
                   <a:srgbClr val="7F0055"/>
                 </a:solidFill>
@@ -25289,7 +25320,7 @@
               <a:t>#endif</a:t>
             </a:r>
             <a:r>
-              <a:rPr lang="en-US" sz="1400" b="1" dirty="0">
+              <a:rPr lang="en-US" sz="1200" b="1" dirty="0">
                 <a:solidFill>
                   <a:srgbClr val="000000"/>
                 </a:solidFill>
@@ -25298,7 +25329,7 @@
               <a:t> </a:t>
             </a:r>
             <a:r>
-              <a:rPr lang="en-US" sz="1400" b="1" dirty="0">
+              <a:rPr lang="en-US" sz="1200" b="1" dirty="0">
                 <a:solidFill>
                   <a:srgbClr val="3F7F5F"/>
                 </a:solidFill>
@@ -25320,7 +25351,7 @@
               </a:spcAft>
               <a:buNone/>
             </a:pPr>
-            <a:endParaRPr lang="en-US" sz="1400" dirty="0"/>
+            <a:endParaRPr lang="en-US" sz="1200" dirty="0"/>
           </a:p>
         </p:txBody>
       </p:sp>
@@ -25696,7 +25727,7 @@
                 </a:solidFill>
                 <a:latin typeface="Consolas" panose="020B0609020204030204" pitchFamily="49" charset="0"/>
               </a:rPr>
-              <a:t> AND2_GATE_init </a:t>
+              <a:t> ADD2_init </a:t>
             </a:r>
             <a:r>
               <a:rPr lang="en-US" sz="1200" dirty="0">
@@ -25709,7 +25740,7 @@
             </a:r>
           </a:p>
           <a:p>
-            <a:pPr marL="228600" indent="0" algn="l">
+            <a:pPr marL="225425" indent="0" algn="l">
               <a:lnSpc>
                 <a:spcPct val="100000"/>
               </a:lnSpc>
@@ -25728,7 +25759,7 @@
                 </a:solidFill>
                 <a:latin typeface="Consolas" panose="020B0609020204030204" pitchFamily="49" charset="0"/>
               </a:rPr>
-              <a:t>and2_gate_instance_t</a:t>
+              <a:t>add2_instance_t</a:t>
             </a:r>
             <a:r>
               <a:rPr lang="en-US" sz="1200" dirty="0">
@@ -25737,11 +25768,11 @@
                 </a:solidFill>
                 <a:latin typeface="Consolas" panose="020B0609020204030204" pitchFamily="49" charset="0"/>
               </a:rPr>
-              <a:t> *   this_and2_gate,</a:t>
-            </a:r>
-          </a:p>
-          <a:p>
-            <a:pPr marL="228600" indent="0" algn="l">
+              <a:t> * this_add2,</a:t>
+            </a:r>
+          </a:p>
+          <a:p>
+            <a:pPr marL="225425" indent="0" algn="l">
               <a:lnSpc>
                 <a:spcPct val="100000"/>
               </a:lnSpc>
@@ -25811,7 +25842,7 @@
             </a:r>
           </a:p>
           <a:p>
-            <a:pPr marL="228600" indent="0" algn="l">
+            <a:pPr marL="225425" indent="0" algn="l">
               <a:lnSpc>
                 <a:spcPct val="100000"/>
               </a:lnSpc>
@@ -25830,7 +25861,7 @@
                 </a:solidFill>
                 <a:latin typeface="Consolas" panose="020B0609020204030204" pitchFamily="49" charset="0"/>
               </a:rPr>
-              <a:t>this_and2_gate-&gt;</a:t>
+              <a:t>this_add2-&gt;</a:t>
             </a:r>
             <a:r>
               <a:rPr lang="en-US" sz="1200" dirty="0" err="1">
@@ -25870,7 +25901,24 @@
             </a:r>
           </a:p>
           <a:p>
-            <a:pPr marL="228600" indent="0" algn="l">
+            <a:pPr marL="225425" indent="0" algn="l">
+              <a:lnSpc>
+                <a:spcPct val="100000"/>
+              </a:lnSpc>
+              <a:spcBef>
+                <a:spcPts val="0"/>
+              </a:spcBef>
+              <a:spcAft>
+                <a:spcPts val="0"/>
+              </a:spcAft>
+              <a:buNone/>
+            </a:pPr>
+            <a:endParaRPr lang="en-US" sz="1200" dirty="0">
+              <a:latin typeface="Consolas" panose="020B0609020204030204" pitchFamily="49" charset="0"/>
+            </a:endParaRPr>
+          </a:p>
+          <a:p>
+            <a:pPr marL="225425" indent="0" algn="l">
               <a:lnSpc>
                 <a:spcPct val="100000"/>
               </a:lnSpc>
@@ -25889,17 +25937,11 @@
                 </a:solidFill>
                 <a:latin typeface="Consolas" panose="020B0609020204030204" pitchFamily="49" charset="0"/>
               </a:rPr>
-              <a:t>// clears A and B registers</a:t>
-            </a:r>
-            <a:endParaRPr lang="en-US" sz="1200" dirty="0">
-              <a:solidFill>
-                <a:srgbClr val="000000"/>
-              </a:solidFill>
-              <a:latin typeface="Consolas" panose="020B0609020204030204" pitchFamily="49" charset="0"/>
-            </a:endParaRPr>
-          </a:p>
-          <a:p>
-            <a:pPr marL="228600" indent="0" algn="l">
+              <a:t>// clear all</a:t>
+            </a:r>
+          </a:p>
+          <a:p>
+            <a:pPr marL="225425" indent="0" algn="l">
               <a:lnSpc>
                 <a:spcPct val="100000"/>
               </a:lnSpc>
@@ -25918,7 +25960,7 @@
                 </a:solidFill>
                 <a:latin typeface="Consolas" panose="020B0609020204030204" pitchFamily="49" charset="0"/>
               </a:rPr>
-              <a:t>HAL_set_8bit_reg(this_and2_gate-&gt;</a:t>
+              <a:t>HAL_set_8bit_reg(this_add2-&gt;</a:t>
             </a:r>
             <a:r>
               <a:rPr lang="en-US" sz="1200" dirty="0" err="1">
@@ -25940,7 +25982,7 @@
             </a:r>
           </a:p>
           <a:p>
-            <a:pPr marL="228600" indent="0" algn="l">
+            <a:pPr marL="225425" indent="0" algn="l">
               <a:lnSpc>
                 <a:spcPct val="100000"/>
               </a:lnSpc>
@@ -25959,7 +26001,7 @@
                 </a:solidFill>
                 <a:latin typeface="Consolas" panose="020B0609020204030204" pitchFamily="49" charset="0"/>
               </a:rPr>
-              <a:t>HAL_set_8bit_reg(this_and2_gate-&gt;</a:t>
+              <a:t>HAL_set_8bit_reg(this_add2-&gt;</a:t>
             </a:r>
             <a:r>
               <a:rPr lang="en-US" sz="1200" dirty="0" err="1">
@@ -26080,7 +26122,7 @@
             </a:r>
           </a:p>
           <a:p>
-            <a:pPr marL="228600" indent="0" algn="l">
+            <a:pPr marL="225425" indent="0" algn="l">
               <a:lnSpc>
                 <a:spcPct val="100000"/>
               </a:lnSpc>
@@ -26099,7 +26141,7 @@
                 </a:solidFill>
                 <a:latin typeface="Consolas" panose="020B0609020204030204" pitchFamily="49" charset="0"/>
               </a:rPr>
-              <a:t>and2_gate_instance_t</a:t>
+              <a:t>add2_instance_t</a:t>
             </a:r>
             <a:r>
               <a:rPr lang="en-US" sz="1200" dirty="0">
@@ -26108,11 +26150,11 @@
                 </a:solidFill>
                 <a:latin typeface="Consolas" panose="020B0609020204030204" pitchFamily="49" charset="0"/>
               </a:rPr>
-              <a:t> *   this_and2_gate,</a:t>
-            </a:r>
-          </a:p>
-          <a:p>
-            <a:pPr marL="228600" indent="0" algn="l">
+              <a:t> * this_add2,</a:t>
+            </a:r>
+          </a:p>
+          <a:p>
+            <a:pPr marL="225425" indent="0" algn="l">
               <a:lnSpc>
                 <a:spcPct val="100000"/>
               </a:lnSpc>
@@ -26182,7 +26224,7 @@
             </a:r>
           </a:p>
           <a:p>
-            <a:pPr marL="228600" indent="0" algn="l">
+            <a:pPr marL="225425" indent="0" algn="l">
               <a:lnSpc>
                 <a:spcPct val="100000"/>
               </a:lnSpc>
@@ -26201,7 +26243,7 @@
                 </a:solidFill>
                 <a:latin typeface="Consolas" panose="020B0609020204030204" pitchFamily="49" charset="0"/>
               </a:rPr>
-              <a:t>HAL_set_8bit_reg(this_and2_gate-&gt;</a:t>
+              <a:t>HAL_set_8bit_reg(this_add2-&gt;</a:t>
             </a:r>
             <a:r>
               <a:rPr lang="en-US" sz="1200" dirty="0" err="1">
@@ -26241,7 +26283,7 @@
             </a:r>
           </a:p>
           <a:p>
-            <a:pPr marL="228600" indent="0" algn="l">
+            <a:pPr marL="225425" indent="0" algn="l">
               <a:lnSpc>
                 <a:spcPct val="100000"/>
               </a:lnSpc>
@@ -26278,7 +26320,7 @@
                 </a:solidFill>
                 <a:latin typeface="Consolas" panose="020B0609020204030204" pitchFamily="49" charset="0"/>
               </a:rPr>
-              <a:t>( this_and2_gate ) == </a:t>
+              <a:t>( this_add2 ) == </a:t>
             </a:r>
             <a:r>
               <a:rPr lang="en-US" sz="1200" dirty="0" err="1">
@@ -26298,6 +26340,9 @@
               </a:rPr>
               <a:t> );</a:t>
             </a:r>
+            <a:endParaRPr lang="en-US" sz="1200" dirty="0">
+              <a:latin typeface="Consolas" panose="020B0609020204030204" pitchFamily="49" charset="0"/>
+            </a:endParaRPr>
           </a:p>
           <a:p>
             <a:pPr marL="0" indent="0" algn="l">
@@ -26403,23 +26448,6 @@
               </a:spcAft>
               <a:buNone/>
             </a:pPr>
-            <a:endParaRPr lang="en-US" sz="1200" dirty="0">
-              <a:latin typeface="Consolas" panose="020B0609020204030204" pitchFamily="49" charset="0"/>
-            </a:endParaRPr>
-          </a:p>
-          <a:p>
-            <a:pPr marL="0" indent="0" algn="l">
-              <a:lnSpc>
-                <a:spcPct val="100000"/>
-              </a:lnSpc>
-              <a:spcBef>
-                <a:spcPts val="0"/>
-              </a:spcBef>
-              <a:spcAft>
-                <a:spcPts val="0"/>
-              </a:spcAft>
-              <a:buNone/>
-            </a:pPr>
             <a:r>
               <a:rPr lang="en-US" sz="1200" b="1" dirty="0">
                 <a:solidFill>
@@ -26467,7 +26495,7 @@
             </a:r>
           </a:p>
           <a:p>
-            <a:pPr marL="228600" indent="0" algn="l">
+            <a:pPr marL="225425" indent="0" algn="l">
               <a:lnSpc>
                 <a:spcPct val="100000"/>
               </a:lnSpc>
@@ -26486,7 +26514,7 @@
                 </a:solidFill>
                 <a:latin typeface="Consolas" panose="020B0609020204030204" pitchFamily="49" charset="0"/>
               </a:rPr>
-              <a:t>and2_gate_instance_t</a:t>
+              <a:t>add2_instance_t</a:t>
             </a:r>
             <a:r>
               <a:rPr lang="en-US" sz="1200" dirty="0">
@@ -26495,11 +26523,11 @@
                 </a:solidFill>
                 <a:latin typeface="Consolas" panose="020B0609020204030204" pitchFamily="49" charset="0"/>
               </a:rPr>
-              <a:t> *   this_and2_gate,</a:t>
-            </a:r>
-          </a:p>
-          <a:p>
-            <a:pPr marL="228600" indent="0" algn="l">
+              <a:t> * this_add2,</a:t>
+            </a:r>
+          </a:p>
+          <a:p>
+            <a:pPr marL="225425" indent="0" algn="l">
               <a:lnSpc>
                 <a:spcPct val="100000"/>
               </a:lnSpc>
@@ -26569,7 +26597,7 @@
             </a:r>
           </a:p>
           <a:p>
-            <a:pPr marL="228600" indent="0" algn="l">
+            <a:pPr marL="225425" indent="0" algn="l">
               <a:lnSpc>
                 <a:spcPct val="100000"/>
               </a:lnSpc>
@@ -26588,7 +26616,7 @@
                 </a:solidFill>
                 <a:latin typeface="Consolas" panose="020B0609020204030204" pitchFamily="49" charset="0"/>
               </a:rPr>
-              <a:t>HAL_set_8bit_reg(this_and2_gate-&gt;</a:t>
+              <a:t>HAL_set_8bit_reg(this_add2-&gt;</a:t>
             </a:r>
             <a:r>
               <a:rPr lang="en-US" sz="1200" dirty="0" err="1">
@@ -26628,7 +26656,7 @@
             </a:r>
           </a:p>
           <a:p>
-            <a:pPr marL="228600" indent="0" algn="l">
+            <a:pPr marL="225425" indent="0" algn="l">
               <a:lnSpc>
                 <a:spcPct val="100000"/>
               </a:lnSpc>
@@ -26665,7 +26693,7 @@
                 </a:solidFill>
                 <a:latin typeface="Consolas" panose="020B0609020204030204" pitchFamily="49" charset="0"/>
               </a:rPr>
-              <a:t>( this_and2_gate ) == </a:t>
+              <a:t>( this_add2 ) == </a:t>
             </a:r>
             <a:r>
               <a:rPr lang="en-US" sz="1200" dirty="0" err="1">
@@ -26789,7 +26817,7 @@
             </a:r>
           </a:p>
           <a:p>
-            <a:pPr marL="228600" indent="0" algn="l">
+            <a:pPr marL="225425" indent="0" algn="l">
               <a:lnSpc>
                 <a:spcPct val="100000"/>
               </a:lnSpc>
@@ -26808,7 +26836,7 @@
                 </a:solidFill>
                 <a:latin typeface="Consolas" panose="020B0609020204030204" pitchFamily="49" charset="0"/>
               </a:rPr>
-              <a:t>and2_gate_instance_t</a:t>
+              <a:t>add2_instance_t</a:t>
             </a:r>
             <a:r>
               <a:rPr lang="en-US" sz="1200" dirty="0">
@@ -26817,11 +26845,11 @@
                 </a:solidFill>
                 <a:latin typeface="Consolas" panose="020B0609020204030204" pitchFamily="49" charset="0"/>
               </a:rPr>
-              <a:t> *   this_and2_gate,</a:t>
-            </a:r>
-          </a:p>
-          <a:p>
-            <a:pPr marL="228600" indent="0" algn="l">
+              <a:t> * this_add2,</a:t>
+            </a:r>
+          </a:p>
+          <a:p>
+            <a:pPr marL="225425" indent="0" algn="l">
               <a:lnSpc>
                 <a:spcPct val="100000"/>
               </a:lnSpc>
@@ -26876,7 +26904,7 @@
             </a:r>
           </a:p>
           <a:p>
-            <a:pPr marL="228600" indent="0" algn="l">
+            <a:pPr marL="225425" indent="0" algn="l">
               <a:lnSpc>
                 <a:spcPct val="100000"/>
               </a:lnSpc>
@@ -26926,7 +26954,7 @@
             </a:r>
           </a:p>
           <a:p>
-            <a:pPr marL="228600" indent="0" algn="l">
+            <a:pPr marL="225425" indent="0" algn="l">
               <a:lnSpc>
                 <a:spcPct val="100000"/>
               </a:lnSpc>
@@ -26958,7 +26986,7 @@
             </a:r>
           </a:p>
           <a:p>
-            <a:pPr marL="457200" indent="0" algn="l">
+            <a:pPr marL="463550" indent="0" algn="l">
               <a:lnSpc>
                 <a:spcPct val="100000"/>
               </a:lnSpc>
@@ -26986,7 +27014,7 @@
                 </a:solidFill>
                 <a:latin typeface="Consolas" panose="020B0609020204030204" pitchFamily="49" charset="0"/>
               </a:rPr>
-              <a:t> = HAL_get_8bit_reg(this_and2_gate-&gt;</a:t>
+              <a:t> = HAL_get_8bit_reg(this_add2-&gt;</a:t>
             </a:r>
             <a:r>
               <a:rPr lang="en-US" sz="1200" dirty="0" err="1">
@@ -27008,7 +27036,7 @@
             </a:r>
           </a:p>
           <a:p>
-            <a:pPr marL="228600" indent="0" algn="l">
+            <a:pPr marL="225425" indent="0" algn="l">
               <a:lnSpc>
                 <a:spcPct val="100000"/>
               </a:lnSpc>
@@ -27058,7 +27086,7 @@
             </a:r>
           </a:p>
           <a:p>
-            <a:pPr marL="457200" indent="0" algn="l">
+            <a:pPr marL="463550" indent="0" algn="l">
               <a:lnSpc>
                 <a:spcPct val="100000"/>
               </a:lnSpc>
@@ -27086,7 +27114,7 @@
                 </a:solidFill>
                 <a:latin typeface="Consolas" panose="020B0609020204030204" pitchFamily="49" charset="0"/>
               </a:rPr>
-              <a:t> = HAL_get_8bit_reg(this_and2_gate-&gt;</a:t>
+              <a:t> = HAL_get_8bit_reg(this_add2-&gt;</a:t>
             </a:r>
             <a:r>
               <a:rPr lang="en-US" sz="1200" dirty="0" err="1">
@@ -27108,7 +27136,7 @@
             </a:r>
           </a:p>
           <a:p>
-            <a:pPr marL="228600" indent="0" algn="l">
+            <a:pPr marL="225425" indent="0" algn="l">
               <a:lnSpc>
                 <a:spcPct val="100000"/>
               </a:lnSpc>
@@ -27158,7 +27186,7 @@
             </a:r>
           </a:p>
           <a:p>
-            <a:pPr marL="457200" indent="0" algn="l">
+            <a:pPr marL="463550" indent="0" algn="l">
               <a:lnSpc>
                 <a:spcPct val="100000"/>
               </a:lnSpc>
@@ -27186,7 +27214,7 @@
                 </a:solidFill>
                 <a:latin typeface="Consolas" panose="020B0609020204030204" pitchFamily="49" charset="0"/>
               </a:rPr>
-              <a:t> = HAL_get_8bit_reg(this_and2_gate-&gt;</a:t>
+              <a:t> = HAL_get_8bit_reg(this_add2-&gt;</a:t>
             </a:r>
             <a:r>
               <a:rPr lang="en-US" sz="1200" dirty="0" err="1">
@@ -27208,7 +27236,7 @@
             </a:r>
           </a:p>
           <a:p>
-            <a:pPr marL="228600" indent="0" algn="l">
+            <a:pPr marL="225425" indent="0" algn="l">
               <a:lnSpc>
                 <a:spcPct val="100000"/>
               </a:lnSpc>
@@ -27231,7 +27259,7 @@
             </a:r>
           </a:p>
           <a:p>
-            <a:pPr marL="457200" indent="0" algn="l">
+            <a:pPr marL="463550" indent="0" algn="l">
               <a:lnSpc>
                 <a:spcPct val="100000"/>
               </a:lnSpc>
@@ -27254,7 +27282,7 @@
             </a:r>
           </a:p>
           <a:p>
-            <a:pPr marL="228600" indent="0" algn="l">
+            <a:pPr marL="225425" indent="0" algn="l">
               <a:lnSpc>
                 <a:spcPct val="100000"/>
               </a:lnSpc>
@@ -27271,7 +27299,7 @@
             </a:endParaRPr>
           </a:p>
           <a:p>
-            <a:pPr marL="228600" indent="0" algn="l">
+            <a:pPr marL="225425" indent="0" algn="l">
               <a:lnSpc>
                 <a:spcPct val="100000"/>
               </a:lnSpc>
@@ -29821,7 +29849,7 @@
             </a:r>
             <a:r>
               <a:rPr lang="en-US" dirty="0"/>
-              <a:t>core the design shown in Fig. ??</a:t>
+              <a:t>core to the design shown in Fig. 12</a:t>
             </a:r>
           </a:p>
           <a:p>
@@ -30825,7 +30853,7 @@
             </a:pPr>
             <a:r>
               <a:rPr lang="en-US" sz="2200" dirty="0"/>
-              <a:t>Go to the bottom of the data sheet to locate the address to ADD2_APB_0</a:t>
+              <a:t>Take note of the address at the bottom of the data sheet for ADD2_APB_0</a:t>
             </a:r>
           </a:p>
         </p:txBody>

</xml_diff>